<commit_message>
Create state machine diagrams
</commit_message>
<xml_diff>
--- a/documentation/Dart_Scoring_System_PDR.pptx
+++ b/documentation/Dart_Scoring_System_PDR.pptx
@@ -11,10 +11,9 @@
     <p:sldId id="260" r:id="rId5"/>
     <p:sldId id="261" r:id="rId6"/>
     <p:sldId id="262" r:id="rId7"/>
-    <p:sldId id="265" r:id="rId8"/>
-    <p:sldId id="263" r:id="rId9"/>
-    <p:sldId id="264" r:id="rId10"/>
-    <p:sldId id="258" r:id="rId11"/>
+    <p:sldId id="266" r:id="rId8"/>
+    <p:sldId id="264" r:id="rId9"/>
+    <p:sldId id="258" r:id="rId10"/>
   </p:sldIdLst>
   <p:sldSz cx="12192000" cy="6858000"/>
   <p:notesSz cx="6858000" cy="9144000"/>
@@ -3404,244 +3403,6 @@
 </p:sld>
 </file>
 
-<file path=ppt/slides/slide10.xml><?xml version="1.0" encoding="utf-8"?>
-<p:sld xmlns:a="http://schemas.openxmlformats.org/drawingml/2006/main" xmlns:r="http://schemas.openxmlformats.org/officeDocument/2006/relationships" xmlns:p="http://schemas.openxmlformats.org/presentationml/2006/main">
-  <p:cSld>
-    <p:spTree>
-      <p:nvGrpSpPr>
-        <p:cNvPr id="1" name=""/>
-        <p:cNvGrpSpPr/>
-        <p:nvPr/>
-      </p:nvGrpSpPr>
-      <p:grpSpPr>
-        <a:xfrm>
-          <a:off x="0" y="0"/>
-          <a:ext cx="0" cy="0"/>
-          <a:chOff x="0" y="0"/>
-          <a:chExt cx="0" cy="0"/>
-        </a:xfrm>
-      </p:grpSpPr>
-      <p:sp>
-        <p:nvSpPr>
-          <p:cNvPr id="2" name="Title 1">
-            <a:extLst>
-              <a:ext uri="{FF2B5EF4-FFF2-40B4-BE49-F238E27FC236}">
-                <a16:creationId xmlns:a16="http://schemas.microsoft.com/office/drawing/2014/main" id="{B3D623C8-8E1B-3FC4-099A-E31712074F02}"/>
-              </a:ext>
-            </a:extLst>
-          </p:cNvPr>
-          <p:cNvSpPr>
-            <a:spLocks noGrp="1"/>
-          </p:cNvSpPr>
-          <p:nvPr>
-            <p:ph type="title"/>
-          </p:nvPr>
-        </p:nvSpPr>
-        <p:spPr/>
-        <p:txBody>
-          <a:bodyPr/>
-          <a:lstStyle/>
-          <a:p>
-            <a:r>
-              <a:rPr lang="en-US"/>
-              <a:t>Concept Diagram</a:t>
-            </a:r>
-            <a:endParaRPr lang="en-US" dirty="0"/>
-          </a:p>
-        </p:txBody>
-      </p:sp>
-      <p:pic>
-        <p:nvPicPr>
-          <p:cNvPr id="9" name="Content Placeholder 8" descr="A diagram of a computer network&#10;&#10;Description automatically generated">
-            <a:extLst>
-              <a:ext uri="{FF2B5EF4-FFF2-40B4-BE49-F238E27FC236}">
-                <a16:creationId xmlns:a16="http://schemas.microsoft.com/office/drawing/2014/main" id="{52626EE7-D42D-6FA3-C209-35D4A7F5273D}"/>
-              </a:ext>
-            </a:extLst>
-          </p:cNvPr>
-          <p:cNvPicPr>
-            <a:picLocks noGrp="1" noChangeAspect="1"/>
-          </p:cNvPicPr>
-          <p:nvPr>
-            <p:ph idx="4294967295"/>
-          </p:nvPr>
-        </p:nvPicPr>
-        <p:blipFill>
-          <a:blip r:embed="rId2">
-            <a:extLst>
-              <a:ext uri="{28A0092B-C50C-407E-A947-70E740481C1C}">
-                <a14:useLocalDpi xmlns:a14="http://schemas.microsoft.com/office/drawing/2010/main" val="0"/>
-              </a:ext>
-            </a:extLst>
-          </a:blip>
-          <a:stretch>
-            <a:fillRect/>
-          </a:stretch>
-        </p:blipFill>
-        <p:spPr>
-          <a:xfrm>
-            <a:off x="2955925" y="1825625"/>
-            <a:ext cx="6280150" cy="4351338"/>
-          </a:xfrm>
-        </p:spPr>
-      </p:pic>
-      <p:sp>
-        <p:nvSpPr>
-          <p:cNvPr id="11" name="TextBox 10">
-            <a:extLst>
-              <a:ext uri="{FF2B5EF4-FFF2-40B4-BE49-F238E27FC236}">
-                <a16:creationId xmlns:a16="http://schemas.microsoft.com/office/drawing/2014/main" id="{94BFEE93-D2A9-2CA5-3F22-189C06E5D3E4}"/>
-              </a:ext>
-            </a:extLst>
-          </p:cNvPr>
-          <p:cNvSpPr txBox="1"/>
-          <p:nvPr/>
-        </p:nvSpPr>
-        <p:spPr>
-          <a:xfrm>
-            <a:off x="5929313" y="5172076"/>
-            <a:ext cx="1809750" cy="923330"/>
-          </a:xfrm>
-          <a:prstGeom prst="rect">
-            <a:avLst/>
-          </a:prstGeom>
-          <a:noFill/>
-        </p:spPr>
-        <p:txBody>
-          <a:bodyPr wrap="square" rtlCol="0">
-            <a:spAutoFit/>
-          </a:bodyPr>
-          <a:lstStyle/>
-          <a:p>
-            <a:pPr algn="ctr"/>
-            <a:r>
-              <a:rPr lang="en-US" dirty="0"/>
-              <a:t>User will select player when ready to throw</a:t>
-            </a:r>
-          </a:p>
-        </p:txBody>
-      </p:sp>
-      <p:sp>
-        <p:nvSpPr>
-          <p:cNvPr id="13" name="TextBox 12">
-            <a:extLst>
-              <a:ext uri="{FF2B5EF4-FFF2-40B4-BE49-F238E27FC236}">
-                <a16:creationId xmlns:a16="http://schemas.microsoft.com/office/drawing/2014/main" id="{360EC8A1-010F-3433-49CA-1375F604A15F}"/>
-              </a:ext>
-            </a:extLst>
-          </p:cNvPr>
-          <p:cNvSpPr txBox="1"/>
-          <p:nvPr/>
-        </p:nvSpPr>
-        <p:spPr>
-          <a:xfrm>
-            <a:off x="1223962" y="1876426"/>
-            <a:ext cx="2128837" cy="923330"/>
-          </a:xfrm>
-          <a:prstGeom prst="rect">
-            <a:avLst/>
-          </a:prstGeom>
-          <a:noFill/>
-        </p:spPr>
-        <p:txBody>
-          <a:bodyPr wrap="square" rtlCol="0">
-            <a:spAutoFit/>
-          </a:bodyPr>
-          <a:lstStyle/>
-          <a:p>
-            <a:pPr algn="ctr"/>
-            <a:r>
-              <a:rPr lang="en-US" dirty="0"/>
-              <a:t>Jetson will use CV to produce dart position and score</a:t>
-            </a:r>
-          </a:p>
-        </p:txBody>
-      </p:sp>
-      <p:sp>
-        <p:nvSpPr>
-          <p:cNvPr id="14" name="TextBox 13">
-            <a:extLst>
-              <a:ext uri="{FF2B5EF4-FFF2-40B4-BE49-F238E27FC236}">
-                <a16:creationId xmlns:a16="http://schemas.microsoft.com/office/drawing/2014/main" id="{5175ACCA-14E8-6008-4F2F-B7A7EBDE2E2D}"/>
-              </a:ext>
-            </a:extLst>
-          </p:cNvPr>
-          <p:cNvSpPr txBox="1"/>
-          <p:nvPr/>
-        </p:nvSpPr>
-        <p:spPr>
-          <a:xfrm>
-            <a:off x="509588" y="3539629"/>
-            <a:ext cx="2843211" cy="923330"/>
-          </a:xfrm>
-          <a:prstGeom prst="rect">
-            <a:avLst/>
-          </a:prstGeom>
-          <a:noFill/>
-        </p:spPr>
-        <p:txBody>
-          <a:bodyPr wrap="square" rtlCol="0">
-            <a:spAutoFit/>
-          </a:bodyPr>
-          <a:lstStyle/>
-          <a:p>
-            <a:pPr algn="ctr"/>
-            <a:r>
-              <a:rPr lang="en-US" dirty="0"/>
-              <a:t>Pi will receive message from Jetson when position has been identified</a:t>
-            </a:r>
-          </a:p>
-        </p:txBody>
-      </p:sp>
-      <p:sp>
-        <p:nvSpPr>
-          <p:cNvPr id="15" name="TextBox 14">
-            <a:extLst>
-              <a:ext uri="{FF2B5EF4-FFF2-40B4-BE49-F238E27FC236}">
-                <a16:creationId xmlns:a16="http://schemas.microsoft.com/office/drawing/2014/main" id="{7A0F2412-4D8D-AC3E-1892-1E0858F8D269}"/>
-              </a:ext>
-            </a:extLst>
-          </p:cNvPr>
-          <p:cNvSpPr txBox="1"/>
-          <p:nvPr/>
-        </p:nvSpPr>
-        <p:spPr>
-          <a:xfrm>
-            <a:off x="9236497" y="3262630"/>
-            <a:ext cx="1809750" cy="1477328"/>
-          </a:xfrm>
-          <a:prstGeom prst="rect">
-            <a:avLst/>
-          </a:prstGeom>
-          <a:noFill/>
-        </p:spPr>
-        <p:txBody>
-          <a:bodyPr wrap="square" rtlCol="0">
-            <a:spAutoFit/>
-          </a:bodyPr>
-          <a:lstStyle/>
-          <a:p>
-            <a:pPr algn="ctr"/>
-            <a:r>
-              <a:rPr lang="en-US" dirty="0"/>
-              <a:t>User can use mobile app to view statistics and current score</a:t>
-            </a:r>
-          </a:p>
-        </p:txBody>
-      </p:sp>
-    </p:spTree>
-    <p:extLst>
-      <p:ext uri="{BB962C8B-B14F-4D97-AF65-F5344CB8AC3E}">
-        <p14:creationId xmlns:p14="http://schemas.microsoft.com/office/powerpoint/2010/main" val="2620406225"/>
-      </p:ext>
-    </p:extLst>
-  </p:cSld>
-  <p:clrMapOvr>
-    <a:masterClrMapping/>
-  </p:clrMapOvr>
-</p:sld>
-</file>
-
 <file path=ppt/slides/slide2.xml><?xml version="1.0" encoding="utf-8"?>
 <p:sld xmlns:a="http://schemas.openxmlformats.org/drawingml/2006/main" xmlns:r="http://schemas.openxmlformats.org/officeDocument/2006/relationships" xmlns:p="http://schemas.openxmlformats.org/presentationml/2006/main">
   <p:cSld>
@@ -3723,6 +3484,20 @@
             <a:r>
               <a:rPr lang="en-US" dirty="0"/>
               <a:t>Functional Description</a:t>
+            </a:r>
+          </a:p>
+          <a:p>
+            <a:pPr lvl="1"/>
+            <a:r>
+              <a:rPr lang="en-US" dirty="0"/>
+              <a:t>Functional Flow</a:t>
+            </a:r>
+          </a:p>
+          <a:p>
+            <a:pPr lvl="1"/>
+            <a:r>
+              <a:rPr lang="en-US" dirty="0"/>
+              <a:t>State Machines</a:t>
             </a:r>
           </a:p>
         </p:txBody>
@@ -3945,34 +3720,6 @@
       </p:sp>
       <p:sp>
         <p:nvSpPr>
-          <p:cNvPr id="4" name="Text Placeholder 3">
-            <a:extLst>
-              <a:ext uri="{FF2B5EF4-FFF2-40B4-BE49-F238E27FC236}">
-                <a16:creationId xmlns:a16="http://schemas.microsoft.com/office/drawing/2014/main" id="{B5806E86-AF9F-0F20-EF07-F5CF3E80C192}"/>
-              </a:ext>
-            </a:extLst>
-          </p:cNvPr>
-          <p:cNvSpPr>
-            <a:spLocks noGrp="1"/>
-          </p:cNvSpPr>
-          <p:nvPr>
-            <p:ph type="body" idx="1"/>
-          </p:nvPr>
-        </p:nvSpPr>
-        <p:spPr/>
-        <p:txBody>
-          <a:bodyPr/>
-          <a:lstStyle/>
-          <a:p>
-            <a:r>
-              <a:rPr lang="en-US" dirty="0"/>
-              <a:t>Capabilities</a:t>
-            </a:r>
-          </a:p>
-        </p:txBody>
-      </p:sp>
-      <p:sp>
-        <p:nvSpPr>
           <p:cNvPr id="5" name="Content Placeholder 4">
             <a:extLst>
               <a:ext uri="{FF2B5EF4-FFF2-40B4-BE49-F238E27FC236}">
@@ -3984,7 +3731,7 @@
             <a:spLocks noGrp="1"/>
           </p:cNvSpPr>
           <p:nvPr>
-            <p:ph sz="half" idx="2"/>
+            <p:ph sz="half" idx="1"/>
           </p:nvPr>
         </p:nvSpPr>
         <p:spPr/>
@@ -4020,35 +3767,7 @@
           <a:p>
             <a:r>
               <a:rPr lang="en-US" dirty="0"/>
-              <a:t>Multi-platform mobile application (Android/iOS) for viewing statistics</a:t>
-            </a:r>
-          </a:p>
-        </p:txBody>
-      </p:sp>
-      <p:sp>
-        <p:nvSpPr>
-          <p:cNvPr id="6" name="Text Placeholder 5">
-            <a:extLst>
-              <a:ext uri="{FF2B5EF4-FFF2-40B4-BE49-F238E27FC236}">
-                <a16:creationId xmlns:a16="http://schemas.microsoft.com/office/drawing/2014/main" id="{91578F83-48D4-7574-59B7-DC2F3001E725}"/>
-              </a:ext>
-            </a:extLst>
-          </p:cNvPr>
-          <p:cNvSpPr>
-            <a:spLocks noGrp="1"/>
-          </p:cNvSpPr>
-          <p:nvPr>
-            <p:ph type="body" sz="quarter" idx="3"/>
-          </p:nvPr>
-        </p:nvSpPr>
-        <p:spPr/>
-        <p:txBody>
-          <a:bodyPr/>
-          <a:lstStyle/>
-          <a:p>
-            <a:r>
-              <a:rPr lang="en-US" dirty="0"/>
-              <a:t>Limitations</a:t>
+              <a:t>Multi-platform mobile application (Android/iOS) for viewing statistics and game</a:t>
             </a:r>
           </a:p>
         </p:txBody>
@@ -4066,7 +3785,7 @@
             <a:spLocks noGrp="1"/>
           </p:cNvSpPr>
           <p:nvPr>
-            <p:ph sz="quarter" idx="4"/>
+            <p:ph sz="half" idx="2"/>
           </p:nvPr>
         </p:nvSpPr>
         <p:spPr/>
@@ -4103,6 +3822,12 @@
             <a:r>
               <a:rPr lang="en-US" dirty="0"/>
               <a:t>One dart thrown at a time (dart rules)</a:t>
+            </a:r>
+          </a:p>
+          <a:p>
+            <a:r>
+              <a:rPr lang="en-US" dirty="0"/>
+              <a:t>Profiles can only be created at user interface</a:t>
             </a:r>
           </a:p>
         </p:txBody>
@@ -4286,17 +4011,17 @@
           <a:p>
             <a:r>
               <a:rPr lang="en-US" dirty="0"/>
-              <a:t>Functional Flow – Scoring and Imaging System</a:t>
+              <a:t>Functional Flow</a:t>
             </a:r>
           </a:p>
         </p:txBody>
       </p:sp>
       <p:pic>
         <p:nvPicPr>
-          <p:cNvPr id="7" name="Picture 6" descr="A diagram of a computer&#10;&#10;Description automatically generated">
-            <a:extLst>
-              <a:ext uri="{FF2B5EF4-FFF2-40B4-BE49-F238E27FC236}">
-                <a16:creationId xmlns:a16="http://schemas.microsoft.com/office/drawing/2014/main" id="{96403F8B-7CBF-14B5-9F21-81167C71A158}"/>
+          <p:cNvPr id="4" name="Picture 3" descr="A diagram of a flowchart">
+            <a:extLst>
+              <a:ext uri="{FF2B5EF4-FFF2-40B4-BE49-F238E27FC236}">
+                <a16:creationId xmlns:a16="http://schemas.microsoft.com/office/drawing/2014/main" id="{D354303D-D174-4F75-6AAB-B10D0DED037A}"/>
               </a:ext>
             </a:extLst>
           </p:cNvPr>
@@ -4319,122 +4044,14 @@
         </p:blipFill>
         <p:spPr>
           <a:xfrm>
-            <a:off x="0" y="2292457"/>
-            <a:ext cx="12192000" cy="2273085"/>
+            <a:off x="0" y="1534196"/>
+            <a:ext cx="12192000" cy="5323804"/>
           </a:xfrm>
           <a:prstGeom prst="rect">
             <a:avLst/>
           </a:prstGeom>
         </p:spPr>
       </p:pic>
-      <p:sp>
-        <p:nvSpPr>
-          <p:cNvPr id="9" name="TextBox 8">
-            <a:extLst>
-              <a:ext uri="{FF2B5EF4-FFF2-40B4-BE49-F238E27FC236}">
-                <a16:creationId xmlns:a16="http://schemas.microsoft.com/office/drawing/2014/main" id="{AF42AC8C-3917-1BB1-633B-37C02E6A640F}"/>
-              </a:ext>
-            </a:extLst>
-          </p:cNvPr>
-          <p:cNvSpPr txBox="1"/>
-          <p:nvPr/>
-        </p:nvSpPr>
-        <p:spPr>
-          <a:xfrm>
-            <a:off x="628651" y="4565541"/>
-            <a:ext cx="2328862" cy="646331"/>
-          </a:xfrm>
-          <a:prstGeom prst="rect">
-            <a:avLst/>
-          </a:prstGeom>
-          <a:noFill/>
-        </p:spPr>
-        <p:txBody>
-          <a:bodyPr wrap="square" rtlCol="0">
-            <a:spAutoFit/>
-          </a:bodyPr>
-          <a:lstStyle/>
-          <a:p>
-            <a:pPr algn="ctr"/>
-            <a:r>
-              <a:rPr lang="en-US" dirty="0"/>
-              <a:t>Both players will select profile to play with</a:t>
-            </a:r>
-          </a:p>
-        </p:txBody>
-      </p:sp>
-      <p:sp>
-        <p:nvSpPr>
-          <p:cNvPr id="10" name="TextBox 9">
-            <a:extLst>
-              <a:ext uri="{FF2B5EF4-FFF2-40B4-BE49-F238E27FC236}">
-                <a16:creationId xmlns:a16="http://schemas.microsoft.com/office/drawing/2014/main" id="{B2DF7258-414D-2DA0-D1A8-6A8FE5737AFA}"/>
-              </a:ext>
-            </a:extLst>
-          </p:cNvPr>
-          <p:cNvSpPr txBox="1"/>
-          <p:nvPr/>
-        </p:nvSpPr>
-        <p:spPr>
-          <a:xfrm>
-            <a:off x="4931569" y="4565542"/>
-            <a:ext cx="2328862" cy="923330"/>
-          </a:xfrm>
-          <a:prstGeom prst="rect">
-            <a:avLst/>
-          </a:prstGeom>
-          <a:noFill/>
-        </p:spPr>
-        <p:txBody>
-          <a:bodyPr wrap="square" rtlCol="0">
-            <a:spAutoFit/>
-          </a:bodyPr>
-          <a:lstStyle/>
-          <a:p>
-            <a:pPr algn="ctr"/>
-            <a:r>
-              <a:rPr lang="en-US" dirty="0"/>
-              <a:t>Display and score updates dependent on game chosen</a:t>
-            </a:r>
-          </a:p>
-        </p:txBody>
-      </p:sp>
-      <p:sp>
-        <p:nvSpPr>
-          <p:cNvPr id="11" name="TextBox 10">
-            <a:extLst>
-              <a:ext uri="{FF2B5EF4-FFF2-40B4-BE49-F238E27FC236}">
-                <a16:creationId xmlns:a16="http://schemas.microsoft.com/office/drawing/2014/main" id="{8BA66426-DF51-4FD3-99C2-D311E3F37121}"/>
-              </a:ext>
-            </a:extLst>
-          </p:cNvPr>
-          <p:cNvSpPr txBox="1"/>
-          <p:nvPr/>
-        </p:nvSpPr>
-        <p:spPr>
-          <a:xfrm>
-            <a:off x="8970169" y="4565542"/>
-            <a:ext cx="2328862" cy="1200329"/>
-          </a:xfrm>
-          <a:prstGeom prst="rect">
-            <a:avLst/>
-          </a:prstGeom>
-          <a:noFill/>
-        </p:spPr>
-        <p:txBody>
-          <a:bodyPr wrap="square" rtlCol="0">
-            <a:spAutoFit/>
-          </a:bodyPr>
-          <a:lstStyle/>
-          <a:p>
-            <a:pPr algn="ctr"/>
-            <a:r>
-              <a:rPr lang="en-US" dirty="0"/>
-              <a:t>Imaging system will only look for darts when triggered by scoring system logic</a:t>
-            </a:r>
-          </a:p>
-        </p:txBody>
-      </p:sp>
     </p:spTree>
     <p:extLst>
       <p:ext uri="{BB962C8B-B14F-4D97-AF65-F5344CB8AC3E}">
@@ -4470,7 +4087,7 @@
           <p:cNvPr id="2" name="Title 1">
             <a:extLst>
               <a:ext uri="{FF2B5EF4-FFF2-40B4-BE49-F238E27FC236}">
-                <a16:creationId xmlns:a16="http://schemas.microsoft.com/office/drawing/2014/main" id="{7A330F99-700F-3673-CD52-CBEE7DCF63D3}"/>
+                <a16:creationId xmlns:a16="http://schemas.microsoft.com/office/drawing/2014/main" id="{5829217E-BB1C-6A60-B832-A026365FFA1D}"/>
               </a:ext>
             </a:extLst>
           </p:cNvPr>
@@ -4488,17 +4105,17 @@
           <a:p>
             <a:r>
               <a:rPr lang="en-US" dirty="0"/>
-              <a:t>Functional Flow – Mobile Application</a:t>
+              <a:t>State Machines</a:t>
             </a:r>
           </a:p>
         </p:txBody>
       </p:sp>
       <p:pic>
         <p:nvPicPr>
-          <p:cNvPr id="4" name="Picture 3" descr="A diagram of a flowchart&#10;&#10;Description automatically generated">
-            <a:extLst>
-              <a:ext uri="{FF2B5EF4-FFF2-40B4-BE49-F238E27FC236}">
-                <a16:creationId xmlns:a16="http://schemas.microsoft.com/office/drawing/2014/main" id="{9B92B21E-C29E-1CC2-9D12-5CC23DE6BB15}"/>
+          <p:cNvPr id="4" name="Picture 3" descr="A diagram of a game">
+            <a:extLst>
+              <a:ext uri="{FF2B5EF4-FFF2-40B4-BE49-F238E27FC236}">
+                <a16:creationId xmlns:a16="http://schemas.microsoft.com/office/drawing/2014/main" id="{971FB472-7BC0-4171-40A3-F9DEE77B6DB0}"/>
               </a:ext>
             </a:extLst>
           </p:cNvPr>
@@ -4521,82 +4138,129 @@
         </p:blipFill>
         <p:spPr>
           <a:xfrm>
-            <a:off x="1976082" y="1800529"/>
-            <a:ext cx="8239835" cy="4258435"/>
+            <a:off x="213681" y="2007336"/>
+            <a:ext cx="6891643" cy="3271934"/>
           </a:xfrm>
           <a:prstGeom prst="rect">
             <a:avLst/>
           </a:prstGeom>
         </p:spPr>
       </p:pic>
-      <p:sp>
-        <p:nvSpPr>
-          <p:cNvPr id="5" name="TextBox 4">
-            <a:extLst>
-              <a:ext uri="{FF2B5EF4-FFF2-40B4-BE49-F238E27FC236}">
-                <a16:creationId xmlns:a16="http://schemas.microsoft.com/office/drawing/2014/main" id="{2AFFEFB3-7AB5-18B8-5D85-87549589524C}"/>
-              </a:ext>
-            </a:extLst>
-          </p:cNvPr>
-          <p:cNvSpPr txBox="1"/>
+      <p:pic>
+        <p:nvPicPr>
+          <p:cNvPr id="3" name="Picture 2" descr="A diagram of a diagram&#10;&#10;Description automatically generated">
+            <a:extLst>
+              <a:ext uri="{FF2B5EF4-FFF2-40B4-BE49-F238E27FC236}">
+                <a16:creationId xmlns:a16="http://schemas.microsoft.com/office/drawing/2014/main" id="{3F9EB007-EDDD-01E7-FED2-60E1EB9D6BFC}"/>
+              </a:ext>
+            </a:extLst>
+          </p:cNvPr>
+          <p:cNvPicPr>
+            <a:picLocks noChangeAspect="1"/>
+          </p:cNvPicPr>
           <p:nvPr/>
-        </p:nvSpPr>
+        </p:nvPicPr>
+        <p:blipFill>
+          <a:blip r:embed="rId3">
+            <a:extLst>
+              <a:ext uri="{28A0092B-C50C-407E-A947-70E740481C1C}">
+                <a14:useLocalDpi xmlns:a14="http://schemas.microsoft.com/office/drawing/2010/main" val="0"/>
+              </a:ext>
+            </a:extLst>
+          </a:blip>
+          <a:stretch>
+            <a:fillRect/>
+          </a:stretch>
+        </p:blipFill>
         <p:spPr>
           <a:xfrm>
-            <a:off x="124943" y="3429000"/>
-            <a:ext cx="1901659" cy="646331"/>
+            <a:off x="7379047" y="2004339"/>
+            <a:ext cx="2606579" cy="3274931"/>
           </a:xfrm>
           <a:prstGeom prst="rect">
             <a:avLst/>
           </a:prstGeom>
-          <a:noFill/>
         </p:spPr>
-        <p:txBody>
-          <a:bodyPr wrap="square" rtlCol="0">
-            <a:spAutoFit/>
-          </a:bodyPr>
-          <a:lstStyle/>
-          <a:p>
-            <a:pPr algn="ctr"/>
-            <a:r>
-              <a:rPr lang="en-US" dirty="0"/>
-              <a:t>Three display options</a:t>
-            </a:r>
-          </a:p>
-        </p:txBody>
-      </p:sp>
-      <p:sp>
-        <p:nvSpPr>
-          <p:cNvPr id="6" name="TextBox 5">
-            <a:extLst>
-              <a:ext uri="{FF2B5EF4-FFF2-40B4-BE49-F238E27FC236}">
-                <a16:creationId xmlns:a16="http://schemas.microsoft.com/office/drawing/2014/main" id="{26B59C40-0505-1062-C226-10DCE3B2A9A9}"/>
-              </a:ext>
-            </a:extLst>
-          </p:cNvPr>
-          <p:cNvSpPr txBox="1"/>
+      </p:pic>
+      <p:pic>
+        <p:nvPicPr>
+          <p:cNvPr id="6" name="Picture 5" descr="A diagram of a process&#10;&#10;Description automatically generated">
+            <a:extLst>
+              <a:ext uri="{FF2B5EF4-FFF2-40B4-BE49-F238E27FC236}">
+                <a16:creationId xmlns:a16="http://schemas.microsoft.com/office/drawing/2014/main" id="{FAEA9D3B-263D-64EC-5783-68D295B52008}"/>
+              </a:ext>
+            </a:extLst>
+          </p:cNvPr>
+          <p:cNvPicPr>
+            <a:picLocks noChangeAspect="1"/>
+          </p:cNvPicPr>
           <p:nvPr/>
-        </p:nvSpPr>
+        </p:nvPicPr>
+        <p:blipFill>
+          <a:blip r:embed="rId4">
+            <a:extLst>
+              <a:ext uri="{28A0092B-C50C-407E-A947-70E740481C1C}">
+                <a14:useLocalDpi xmlns:a14="http://schemas.microsoft.com/office/drawing/2010/main" val="0"/>
+              </a:ext>
+            </a:extLst>
+          </a:blip>
+          <a:stretch>
+            <a:fillRect/>
+          </a:stretch>
+        </p:blipFill>
         <p:spPr>
           <a:xfrm>
-            <a:off x="10215917" y="3288992"/>
-            <a:ext cx="1901659" cy="923330"/>
+            <a:off x="10259350" y="2004339"/>
+            <a:ext cx="1718969" cy="3274931"/>
           </a:xfrm>
           <a:prstGeom prst="rect">
             <a:avLst/>
           </a:prstGeom>
-          <a:noFill/>
         </p:spPr>
-        <p:txBody>
-          <a:bodyPr wrap="square" rtlCol="0">
-            <a:spAutoFit/>
-          </a:bodyPr>
+      </p:pic>
+      <p:sp>
+        <p:nvSpPr>
+          <p:cNvPr id="8" name="Rectangle: Rounded Corners 7">
+            <a:extLst>
+              <a:ext uri="{FF2B5EF4-FFF2-40B4-BE49-F238E27FC236}">
+                <a16:creationId xmlns:a16="http://schemas.microsoft.com/office/drawing/2014/main" id="{C8A31BB6-F0E8-CB6C-1053-D5D8E3272864}"/>
+              </a:ext>
+            </a:extLst>
+          </p:cNvPr>
+          <p:cNvSpPr/>
+          <p:nvPr/>
+        </p:nvSpPr>
+        <p:spPr>
+          <a:xfrm>
+            <a:off x="1098795" y="6242637"/>
+            <a:ext cx="9994409" cy="572303"/>
+          </a:xfrm>
+          <a:prstGeom prst="roundRect">
+            <a:avLst/>
+          </a:prstGeom>
+        </p:spPr>
+        <p:style>
+          <a:lnRef idx="1">
+            <a:schemeClr val="accent1"/>
+          </a:lnRef>
+          <a:fillRef idx="2">
+            <a:schemeClr val="accent1"/>
+          </a:fillRef>
+          <a:effectRef idx="1">
+            <a:schemeClr val="accent1"/>
+          </a:effectRef>
+          <a:fontRef idx="minor">
+            <a:schemeClr val="dk1"/>
+          </a:fontRef>
+        </p:style>
+        <p:txBody>
+          <a:bodyPr rtlCol="0" anchor="ctr"/>
           <a:lstStyle/>
           <a:p>
             <a:pPr algn="ctr"/>
             <a:r>
-              <a:rPr lang="en-US" dirty="0"/>
-              <a:t>Return functionality at each level</a:t>
+              <a:rPr lang="en-US" sz="2800" dirty="0"/>
+              <a:t>Scoring and imaging state machines dependent on each other</a:t>
             </a:r>
           </a:p>
         </p:txBody>
@@ -4604,7 +4268,7 @@
     </p:spTree>
     <p:extLst>
       <p:ext uri="{BB962C8B-B14F-4D97-AF65-F5344CB8AC3E}">
-        <p14:creationId xmlns:p14="http://schemas.microsoft.com/office/powerpoint/2010/main" val="3985732760"/>
+        <p14:creationId xmlns:p14="http://schemas.microsoft.com/office/powerpoint/2010/main" val="2337112987"/>
       </p:ext>
     </p:extLst>
   </p:cSld>
@@ -4633,10 +4297,10 @@
       </p:grpSpPr>
       <p:sp>
         <p:nvSpPr>
-          <p:cNvPr id="2" name="Title 1">
-            <a:extLst>
-              <a:ext uri="{FF2B5EF4-FFF2-40B4-BE49-F238E27FC236}">
-                <a16:creationId xmlns:a16="http://schemas.microsoft.com/office/drawing/2014/main" id="{5829217E-BB1C-6A60-B832-A026365FFA1D}"/>
+          <p:cNvPr id="3" name="Title 2">
+            <a:extLst>
+              <a:ext uri="{FF2B5EF4-FFF2-40B4-BE49-F238E27FC236}">
+                <a16:creationId xmlns:a16="http://schemas.microsoft.com/office/drawing/2014/main" id="{1F208E80-636B-BFE8-2DD4-2949F302529A}"/>
               </a:ext>
             </a:extLst>
           </p:cNvPr>
@@ -4647,14 +4311,22 @@
             <p:ph type="title"/>
           </p:nvPr>
         </p:nvSpPr>
-        <p:spPr/>
-        <p:txBody>
-          <a:bodyPr/>
-          <a:lstStyle/>
-          <a:p>
-            <a:r>
-              <a:rPr lang="en-US" dirty="0"/>
-              <a:t>State Machine Flow</a:t>
+        <p:spPr>
+          <a:xfrm>
+            <a:off x="838200" y="2766218"/>
+            <a:ext cx="10515600" cy="1325563"/>
+          </a:xfrm>
+        </p:spPr>
+        <p:txBody>
+          <a:bodyPr>
+            <a:normAutofit/>
+          </a:bodyPr>
+          <a:lstStyle/>
+          <a:p>
+            <a:pPr algn="ctr"/>
+            <a:r>
+              <a:rPr lang="en-US" sz="6000" dirty="0"/>
+              <a:t>Backup</a:t>
             </a:r>
           </a:p>
         </p:txBody>
@@ -4662,7 +4334,7 @@
     </p:spTree>
     <p:extLst>
       <p:ext uri="{BB962C8B-B14F-4D97-AF65-F5344CB8AC3E}">
-        <p14:creationId xmlns:p14="http://schemas.microsoft.com/office/powerpoint/2010/main" val="112431058"/>
+        <p14:creationId xmlns:p14="http://schemas.microsoft.com/office/powerpoint/2010/main" val="46388902"/>
       </p:ext>
     </p:extLst>
   </p:cSld>
@@ -4691,10 +4363,10 @@
       </p:grpSpPr>
       <p:sp>
         <p:nvSpPr>
-          <p:cNvPr id="3" name="Title 2">
-            <a:extLst>
-              <a:ext uri="{FF2B5EF4-FFF2-40B4-BE49-F238E27FC236}">
-                <a16:creationId xmlns:a16="http://schemas.microsoft.com/office/drawing/2014/main" id="{1F208E80-636B-BFE8-2DD4-2949F302529A}"/>
+          <p:cNvPr id="2" name="Title 1">
+            <a:extLst>
+              <a:ext uri="{FF2B5EF4-FFF2-40B4-BE49-F238E27FC236}">
+                <a16:creationId xmlns:a16="http://schemas.microsoft.com/office/drawing/2014/main" id="{B3D623C8-8E1B-3FC4-099A-E31712074F02}"/>
               </a:ext>
             </a:extLst>
           </p:cNvPr>
@@ -4705,22 +4377,194 @@
             <p:ph type="title"/>
           </p:nvPr>
         </p:nvSpPr>
+        <p:spPr/>
+        <p:txBody>
+          <a:bodyPr/>
+          <a:lstStyle/>
+          <a:p>
+            <a:r>
+              <a:rPr lang="en-US"/>
+              <a:t>Concept Diagram</a:t>
+            </a:r>
+            <a:endParaRPr lang="en-US" dirty="0"/>
+          </a:p>
+        </p:txBody>
+      </p:sp>
+      <p:pic>
+        <p:nvPicPr>
+          <p:cNvPr id="9" name="Content Placeholder 8" descr="A diagram of a computer network&#10;&#10;Description automatically generated">
+            <a:extLst>
+              <a:ext uri="{FF2B5EF4-FFF2-40B4-BE49-F238E27FC236}">
+                <a16:creationId xmlns:a16="http://schemas.microsoft.com/office/drawing/2014/main" id="{52626EE7-D42D-6FA3-C209-35D4A7F5273D}"/>
+              </a:ext>
+            </a:extLst>
+          </p:cNvPr>
+          <p:cNvPicPr>
+            <a:picLocks noGrp="1" noChangeAspect="1"/>
+          </p:cNvPicPr>
+          <p:nvPr>
+            <p:ph idx="4294967295"/>
+          </p:nvPr>
+        </p:nvPicPr>
+        <p:blipFill>
+          <a:blip r:embed="rId2">
+            <a:extLst>
+              <a:ext uri="{28A0092B-C50C-407E-A947-70E740481C1C}">
+                <a14:useLocalDpi xmlns:a14="http://schemas.microsoft.com/office/drawing/2010/main" val="0"/>
+              </a:ext>
+            </a:extLst>
+          </a:blip>
+          <a:stretch>
+            <a:fillRect/>
+          </a:stretch>
+        </p:blipFill>
         <p:spPr>
           <a:xfrm>
-            <a:off x="838200" y="2766218"/>
-            <a:ext cx="10515600" cy="1325563"/>
+            <a:off x="2955925" y="1825625"/>
+            <a:ext cx="6280150" cy="4351338"/>
           </a:xfrm>
         </p:spPr>
-        <p:txBody>
-          <a:bodyPr>
-            <a:normAutofit/>
+      </p:pic>
+      <p:sp>
+        <p:nvSpPr>
+          <p:cNvPr id="11" name="TextBox 10">
+            <a:extLst>
+              <a:ext uri="{FF2B5EF4-FFF2-40B4-BE49-F238E27FC236}">
+                <a16:creationId xmlns:a16="http://schemas.microsoft.com/office/drawing/2014/main" id="{94BFEE93-D2A9-2CA5-3F22-189C06E5D3E4}"/>
+              </a:ext>
+            </a:extLst>
+          </p:cNvPr>
+          <p:cNvSpPr txBox="1"/>
+          <p:nvPr/>
+        </p:nvSpPr>
+        <p:spPr>
+          <a:xfrm>
+            <a:off x="5929313" y="5172076"/>
+            <a:ext cx="1809750" cy="923330"/>
+          </a:xfrm>
+          <a:prstGeom prst="rect">
+            <a:avLst/>
+          </a:prstGeom>
+          <a:noFill/>
+        </p:spPr>
+        <p:txBody>
+          <a:bodyPr wrap="square" rtlCol="0">
+            <a:spAutoFit/>
           </a:bodyPr>
           <a:lstStyle/>
           <a:p>
             <a:pPr algn="ctr"/>
             <a:r>
-              <a:rPr lang="en-US" sz="6000" dirty="0"/>
-              <a:t>Backup</a:t>
+              <a:rPr lang="en-US" dirty="0"/>
+              <a:t>User will select player when ready to throw</a:t>
+            </a:r>
+          </a:p>
+        </p:txBody>
+      </p:sp>
+      <p:sp>
+        <p:nvSpPr>
+          <p:cNvPr id="13" name="TextBox 12">
+            <a:extLst>
+              <a:ext uri="{FF2B5EF4-FFF2-40B4-BE49-F238E27FC236}">
+                <a16:creationId xmlns:a16="http://schemas.microsoft.com/office/drawing/2014/main" id="{360EC8A1-010F-3433-49CA-1375F604A15F}"/>
+              </a:ext>
+            </a:extLst>
+          </p:cNvPr>
+          <p:cNvSpPr txBox="1"/>
+          <p:nvPr/>
+        </p:nvSpPr>
+        <p:spPr>
+          <a:xfrm>
+            <a:off x="1223962" y="1876426"/>
+            <a:ext cx="2128837" cy="923330"/>
+          </a:xfrm>
+          <a:prstGeom prst="rect">
+            <a:avLst/>
+          </a:prstGeom>
+          <a:noFill/>
+        </p:spPr>
+        <p:txBody>
+          <a:bodyPr wrap="square" rtlCol="0">
+            <a:spAutoFit/>
+          </a:bodyPr>
+          <a:lstStyle/>
+          <a:p>
+            <a:pPr algn="ctr"/>
+            <a:r>
+              <a:rPr lang="en-US" dirty="0"/>
+              <a:t>Jetson will use CV to produce dart position and score</a:t>
+            </a:r>
+          </a:p>
+        </p:txBody>
+      </p:sp>
+      <p:sp>
+        <p:nvSpPr>
+          <p:cNvPr id="14" name="TextBox 13">
+            <a:extLst>
+              <a:ext uri="{FF2B5EF4-FFF2-40B4-BE49-F238E27FC236}">
+                <a16:creationId xmlns:a16="http://schemas.microsoft.com/office/drawing/2014/main" id="{5175ACCA-14E8-6008-4F2F-B7A7EBDE2E2D}"/>
+              </a:ext>
+            </a:extLst>
+          </p:cNvPr>
+          <p:cNvSpPr txBox="1"/>
+          <p:nvPr/>
+        </p:nvSpPr>
+        <p:spPr>
+          <a:xfrm>
+            <a:off x="509588" y="3539629"/>
+            <a:ext cx="2843211" cy="923330"/>
+          </a:xfrm>
+          <a:prstGeom prst="rect">
+            <a:avLst/>
+          </a:prstGeom>
+          <a:noFill/>
+        </p:spPr>
+        <p:txBody>
+          <a:bodyPr wrap="square" rtlCol="0">
+            <a:spAutoFit/>
+          </a:bodyPr>
+          <a:lstStyle/>
+          <a:p>
+            <a:pPr algn="ctr"/>
+            <a:r>
+              <a:rPr lang="en-US" dirty="0"/>
+              <a:t>Pi will receive message from Jetson when position has been identified</a:t>
+            </a:r>
+          </a:p>
+        </p:txBody>
+      </p:sp>
+      <p:sp>
+        <p:nvSpPr>
+          <p:cNvPr id="15" name="TextBox 14">
+            <a:extLst>
+              <a:ext uri="{FF2B5EF4-FFF2-40B4-BE49-F238E27FC236}">
+                <a16:creationId xmlns:a16="http://schemas.microsoft.com/office/drawing/2014/main" id="{7A0F2412-4D8D-AC3E-1892-1E0858F8D269}"/>
+              </a:ext>
+            </a:extLst>
+          </p:cNvPr>
+          <p:cNvSpPr txBox="1"/>
+          <p:nvPr/>
+        </p:nvSpPr>
+        <p:spPr>
+          <a:xfrm>
+            <a:off x="9236497" y="3262630"/>
+            <a:ext cx="1809750" cy="1477328"/>
+          </a:xfrm>
+          <a:prstGeom prst="rect">
+            <a:avLst/>
+          </a:prstGeom>
+          <a:noFill/>
+        </p:spPr>
+        <p:txBody>
+          <a:bodyPr wrap="square" rtlCol="0">
+            <a:spAutoFit/>
+          </a:bodyPr>
+          <a:lstStyle/>
+          <a:p>
+            <a:pPr algn="ctr"/>
+            <a:r>
+              <a:rPr lang="en-US" dirty="0"/>
+              <a:t>User can use mobile app to view statistics and current score</a:t>
             </a:r>
           </a:p>
         </p:txBody>
@@ -4728,7 +4572,7 @@
     </p:spTree>
     <p:extLst>
       <p:ext uri="{BB962C8B-B14F-4D97-AF65-F5344CB8AC3E}">
-        <p14:creationId xmlns:p14="http://schemas.microsoft.com/office/powerpoint/2010/main" val="46388902"/>
+        <p14:creationId xmlns:p14="http://schemas.microsoft.com/office/powerpoint/2010/main" val="2620406225"/>
       </p:ext>
     </p:extLst>
   </p:cSld>

</xml_diff>

<commit_message>
3 complete pdr functional description (#9)
* Create functional diagrams

* Create state machine diagrams
</commit_message>
<xml_diff>
--- a/documentation/Dart_Scoring_System_PDR.pptx
+++ b/documentation/Dart_Scoring_System_PDR.pptx
@@ -9,6 +9,11 @@
     <p:sldId id="259" r:id="rId3"/>
     <p:sldId id="257" r:id="rId4"/>
     <p:sldId id="260" r:id="rId5"/>
+    <p:sldId id="261" r:id="rId6"/>
+    <p:sldId id="262" r:id="rId7"/>
+    <p:sldId id="266" r:id="rId8"/>
+    <p:sldId id="264" r:id="rId9"/>
+    <p:sldId id="258" r:id="rId10"/>
   </p:sldIdLst>
   <p:sldSz cx="12192000" cy="6858000"/>
   <p:notesSz cx="6858000" cy="9144000"/>
@@ -107,6 +112,11 @@
       </a:defRPr>
     </a:lvl9pPr>
   </p:defaultTextStyle>
+  <p:extLst>
+    <p:ext uri="{EFAFB233-063F-42B5-8137-9DF3F51BA10A}">
+      <p15:sldGuideLst xmlns:p15="http://schemas.microsoft.com/office/powerpoint/2012/main"/>
+    </p:ext>
+  </p:extLst>
 </p:presentation>
 </file>
 
@@ -257,7 +267,7 @@
           <a:p>
             <a:fld id="{0D2FDF6F-1EA0-4374-A917-9D813E578D69}" type="datetimeFigureOut">
               <a:rPr lang="en-US" smtClean="0"/>
-              <a:t>9/13/2023</a:t>
+              <a:t>9/15/2023</a:t>
             </a:fld>
             <a:endParaRPr lang="en-US"/>
           </a:p>
@@ -455,7 +465,7 @@
           <a:p>
             <a:fld id="{0D2FDF6F-1EA0-4374-A917-9D813E578D69}" type="datetimeFigureOut">
               <a:rPr lang="en-US" smtClean="0"/>
-              <a:t>9/13/2023</a:t>
+              <a:t>9/15/2023</a:t>
             </a:fld>
             <a:endParaRPr lang="en-US"/>
           </a:p>
@@ -663,7 +673,7 @@
           <a:p>
             <a:fld id="{0D2FDF6F-1EA0-4374-A917-9D813E578D69}" type="datetimeFigureOut">
               <a:rPr lang="en-US" smtClean="0"/>
-              <a:t>9/13/2023</a:t>
+              <a:t>9/15/2023</a:t>
             </a:fld>
             <a:endParaRPr lang="en-US"/>
           </a:p>
@@ -861,7 +871,7 @@
           <a:p>
             <a:fld id="{0D2FDF6F-1EA0-4374-A917-9D813E578D69}" type="datetimeFigureOut">
               <a:rPr lang="en-US" smtClean="0"/>
-              <a:t>9/13/2023</a:t>
+              <a:t>9/15/2023</a:t>
             </a:fld>
             <a:endParaRPr lang="en-US"/>
           </a:p>
@@ -1136,7 +1146,7 @@
           <a:p>
             <a:fld id="{0D2FDF6F-1EA0-4374-A917-9D813E578D69}" type="datetimeFigureOut">
               <a:rPr lang="en-US" smtClean="0"/>
-              <a:t>9/13/2023</a:t>
+              <a:t>9/15/2023</a:t>
             </a:fld>
             <a:endParaRPr lang="en-US"/>
           </a:p>
@@ -1401,7 +1411,7 @@
           <a:p>
             <a:fld id="{0D2FDF6F-1EA0-4374-A917-9D813E578D69}" type="datetimeFigureOut">
               <a:rPr lang="en-US" smtClean="0"/>
-              <a:t>9/13/2023</a:t>
+              <a:t>9/15/2023</a:t>
             </a:fld>
             <a:endParaRPr lang="en-US"/>
           </a:p>
@@ -1813,7 +1823,7 @@
           <a:p>
             <a:fld id="{0D2FDF6F-1EA0-4374-A917-9D813E578D69}" type="datetimeFigureOut">
               <a:rPr lang="en-US" smtClean="0"/>
-              <a:t>9/13/2023</a:t>
+              <a:t>9/15/2023</a:t>
             </a:fld>
             <a:endParaRPr lang="en-US"/>
           </a:p>
@@ -1954,7 +1964,7 @@
           <a:p>
             <a:fld id="{0D2FDF6F-1EA0-4374-A917-9D813E578D69}" type="datetimeFigureOut">
               <a:rPr lang="en-US" smtClean="0"/>
-              <a:t>9/13/2023</a:t>
+              <a:t>9/15/2023</a:t>
             </a:fld>
             <a:endParaRPr lang="en-US"/>
           </a:p>
@@ -2067,7 +2077,7 @@
           <a:p>
             <a:fld id="{0D2FDF6F-1EA0-4374-A917-9D813E578D69}" type="datetimeFigureOut">
               <a:rPr lang="en-US" smtClean="0"/>
-              <a:t>9/13/2023</a:t>
+              <a:t>9/15/2023</a:t>
             </a:fld>
             <a:endParaRPr lang="en-US"/>
           </a:p>
@@ -2378,7 +2388,7 @@
           <a:p>
             <a:fld id="{0D2FDF6F-1EA0-4374-A917-9D813E578D69}" type="datetimeFigureOut">
               <a:rPr lang="en-US" smtClean="0"/>
-              <a:t>9/13/2023</a:t>
+              <a:t>9/15/2023</a:t>
             </a:fld>
             <a:endParaRPr lang="en-US"/>
           </a:p>
@@ -2666,7 +2676,7 @@
           <a:p>
             <a:fld id="{0D2FDF6F-1EA0-4374-A917-9D813E578D69}" type="datetimeFigureOut">
               <a:rPr lang="en-US" smtClean="0"/>
-              <a:t>9/13/2023</a:t>
+              <a:t>9/15/2023</a:t>
             </a:fld>
             <a:endParaRPr lang="en-US"/>
           </a:p>
@@ -2907,7 +2917,7 @@
           <a:p>
             <a:fld id="{0D2FDF6F-1EA0-4374-A917-9D813E578D69}" type="datetimeFigureOut">
               <a:rPr lang="en-US" smtClean="0"/>
-              <a:t>9/13/2023</a:t>
+              <a:t>9/15/2023</a:t>
             </a:fld>
             <a:endParaRPr lang="en-US"/>
           </a:p>
@@ -3470,6 +3480,26 @@
               <a:t>Capabilities &amp; Limitations</a:t>
             </a:r>
           </a:p>
+          <a:p>
+            <a:r>
+              <a:rPr lang="en-US" dirty="0"/>
+              <a:t>Functional Description</a:t>
+            </a:r>
+          </a:p>
+          <a:p>
+            <a:pPr lvl="1"/>
+            <a:r>
+              <a:rPr lang="en-US" dirty="0"/>
+              <a:t>Functional Flow</a:t>
+            </a:r>
+          </a:p>
+          <a:p>
+            <a:pPr lvl="1"/>
+            <a:r>
+              <a:rPr lang="en-US" dirty="0"/>
+              <a:t>State Machines</a:t>
+            </a:r>
+          </a:p>
         </p:txBody>
       </p:sp>
     </p:spTree>
@@ -3619,7 +3649,7 @@
           <a:p>
             <a:r>
               <a:rPr lang="en-US" dirty="0"/>
-              <a:t>System will be capable of a few games at first – expansion of game selection easy once concept is complete</a:t>
+              <a:t>System will be capable of two games at first – expansion of game selection easy once concept is complete</a:t>
             </a:r>
           </a:p>
           <a:p>
@@ -3690,34 +3720,6 @@
       </p:sp>
       <p:sp>
         <p:nvSpPr>
-          <p:cNvPr id="4" name="Text Placeholder 3">
-            <a:extLst>
-              <a:ext uri="{FF2B5EF4-FFF2-40B4-BE49-F238E27FC236}">
-                <a16:creationId xmlns:a16="http://schemas.microsoft.com/office/drawing/2014/main" id="{B5806E86-AF9F-0F20-EF07-F5CF3E80C192}"/>
-              </a:ext>
-            </a:extLst>
-          </p:cNvPr>
-          <p:cNvSpPr>
-            <a:spLocks noGrp="1"/>
-          </p:cNvSpPr>
-          <p:nvPr>
-            <p:ph type="body" idx="1"/>
-          </p:nvPr>
-        </p:nvSpPr>
-        <p:spPr/>
-        <p:txBody>
-          <a:bodyPr/>
-          <a:lstStyle/>
-          <a:p>
-            <a:r>
-              <a:rPr lang="en-US" dirty="0"/>
-              <a:t>Capabilities</a:t>
-            </a:r>
-          </a:p>
-        </p:txBody>
-      </p:sp>
-      <p:sp>
-        <p:nvSpPr>
           <p:cNvPr id="5" name="Content Placeholder 4">
             <a:extLst>
               <a:ext uri="{FF2B5EF4-FFF2-40B4-BE49-F238E27FC236}">
@@ -3729,13 +3731,13 @@
             <a:spLocks noGrp="1"/>
           </p:cNvSpPr>
           <p:nvPr>
-            <p:ph sz="half" idx="2"/>
+            <p:ph sz="half" idx="1"/>
           </p:nvPr>
         </p:nvSpPr>
         <p:spPr/>
         <p:txBody>
           <a:bodyPr>
-            <a:normAutofit fontScale="92500" lnSpcReduction="10000"/>
+            <a:normAutofit fontScale="92500" lnSpcReduction="20000"/>
           </a:bodyPr>
           <a:lstStyle/>
           <a:p>
@@ -3765,35 +3767,7 @@
           <a:p>
             <a:r>
               <a:rPr lang="en-US" dirty="0"/>
-              <a:t>Multi-platform mobile application (Android/iOS)</a:t>
-            </a:r>
-          </a:p>
-        </p:txBody>
-      </p:sp>
-      <p:sp>
-        <p:nvSpPr>
-          <p:cNvPr id="6" name="Text Placeholder 5">
-            <a:extLst>
-              <a:ext uri="{FF2B5EF4-FFF2-40B4-BE49-F238E27FC236}">
-                <a16:creationId xmlns:a16="http://schemas.microsoft.com/office/drawing/2014/main" id="{91578F83-48D4-7574-59B7-DC2F3001E725}"/>
-              </a:ext>
-            </a:extLst>
-          </p:cNvPr>
-          <p:cNvSpPr>
-            <a:spLocks noGrp="1"/>
-          </p:cNvSpPr>
-          <p:nvPr>
-            <p:ph type="body" sz="quarter" idx="3"/>
-          </p:nvPr>
-        </p:nvSpPr>
-        <p:spPr/>
-        <p:txBody>
-          <a:bodyPr/>
-          <a:lstStyle/>
-          <a:p>
-            <a:r>
-              <a:rPr lang="en-US" dirty="0"/>
-              <a:t>Limitations</a:t>
+              <a:t>Multi-platform mobile application (Android/iOS) for viewing statistics and game</a:t>
             </a:r>
           </a:p>
         </p:txBody>
@@ -3811,13 +3785,13 @@
             <a:spLocks noGrp="1"/>
           </p:cNvSpPr>
           <p:nvPr>
-            <p:ph sz="quarter" idx="4"/>
+            <p:ph sz="half" idx="2"/>
           </p:nvPr>
         </p:nvSpPr>
         <p:spPr/>
         <p:txBody>
           <a:bodyPr>
-            <a:normAutofit fontScale="92500" lnSpcReduction="10000"/>
+            <a:normAutofit fontScale="92500" lnSpcReduction="20000"/>
           </a:bodyPr>
           <a:lstStyle/>
           <a:p>
@@ -3841,7 +3815,19 @@
           <a:p>
             <a:r>
               <a:rPr lang="en-US" dirty="0"/>
-              <a:t>Two player limit</a:t>
+              <a:t>Two player limit (dart rules)</a:t>
+            </a:r>
+          </a:p>
+          <a:p>
+            <a:r>
+              <a:rPr lang="en-US" dirty="0"/>
+              <a:t>One dart thrown at a time (dart rules)</a:t>
+            </a:r>
+          </a:p>
+          <a:p>
+            <a:r>
+              <a:rPr lang="en-US" dirty="0"/>
+              <a:t>Profiles can only be created at user interface</a:t>
             </a:r>
           </a:p>
         </p:txBody>
@@ -3850,6 +3836,743 @@
     <p:extLst>
       <p:ext uri="{BB962C8B-B14F-4D97-AF65-F5344CB8AC3E}">
         <p14:creationId xmlns:p14="http://schemas.microsoft.com/office/powerpoint/2010/main" val="960418039"/>
+      </p:ext>
+    </p:extLst>
+  </p:cSld>
+  <p:clrMapOvr>
+    <a:masterClrMapping/>
+  </p:clrMapOvr>
+</p:sld>
+</file>
+
+<file path=ppt/slides/slide5.xml><?xml version="1.0" encoding="utf-8"?>
+<p:sld xmlns:a="http://schemas.openxmlformats.org/drawingml/2006/main" xmlns:r="http://schemas.openxmlformats.org/officeDocument/2006/relationships" xmlns:p="http://schemas.openxmlformats.org/presentationml/2006/main">
+  <p:cSld>
+    <p:spTree>
+      <p:nvGrpSpPr>
+        <p:cNvPr id="1" name=""/>
+        <p:cNvGrpSpPr/>
+        <p:nvPr/>
+      </p:nvGrpSpPr>
+      <p:grpSpPr>
+        <a:xfrm>
+          <a:off x="0" y="0"/>
+          <a:ext cx="0" cy="0"/>
+          <a:chOff x="0" y="0"/>
+          <a:chExt cx="0" cy="0"/>
+        </a:xfrm>
+      </p:grpSpPr>
+      <p:sp>
+        <p:nvSpPr>
+          <p:cNvPr id="7" name="Title 6">
+            <a:extLst>
+              <a:ext uri="{FF2B5EF4-FFF2-40B4-BE49-F238E27FC236}">
+                <a16:creationId xmlns:a16="http://schemas.microsoft.com/office/drawing/2014/main" id="{DDD555A1-94B8-E4BF-BF09-52E5DEDD5DDF}"/>
+              </a:ext>
+            </a:extLst>
+          </p:cNvPr>
+          <p:cNvSpPr>
+            <a:spLocks noGrp="1"/>
+          </p:cNvSpPr>
+          <p:nvPr>
+            <p:ph type="title"/>
+          </p:nvPr>
+        </p:nvSpPr>
+        <p:spPr/>
+        <p:txBody>
+          <a:bodyPr/>
+          <a:lstStyle/>
+          <a:p>
+            <a:r>
+              <a:rPr lang="en-US" dirty="0"/>
+              <a:t>Functional Description</a:t>
+            </a:r>
+          </a:p>
+        </p:txBody>
+      </p:sp>
+      <p:sp>
+        <p:nvSpPr>
+          <p:cNvPr id="10" name="Content Placeholder 9">
+            <a:extLst>
+              <a:ext uri="{FF2B5EF4-FFF2-40B4-BE49-F238E27FC236}">
+                <a16:creationId xmlns:a16="http://schemas.microsoft.com/office/drawing/2014/main" id="{61ED948E-2085-2882-288A-2BF7A639C9CB}"/>
+              </a:ext>
+            </a:extLst>
+          </p:cNvPr>
+          <p:cNvSpPr>
+            <a:spLocks noGrp="1"/>
+          </p:cNvSpPr>
+          <p:nvPr>
+            <p:ph idx="1"/>
+          </p:nvPr>
+        </p:nvSpPr>
+        <p:spPr/>
+        <p:txBody>
+          <a:bodyPr>
+            <a:normAutofit/>
+          </a:bodyPr>
+          <a:lstStyle/>
+          <a:p>
+            <a:r>
+              <a:rPr lang="en-US" dirty="0"/>
+              <a:t>User will start game, select profile, and choose game to play via touchscreen user interface</a:t>
+            </a:r>
+          </a:p>
+          <a:p>
+            <a:r>
+              <a:rPr lang="en-US" dirty="0"/>
+              <a:t>Imaging system will begin looking for dart once user profile is selected</a:t>
+            </a:r>
+          </a:p>
+          <a:p>
+            <a:pPr lvl="1"/>
+            <a:r>
+              <a:rPr lang="en-US" dirty="0"/>
+              <a:t>Will use known datasets to identify dart tip location, map to dartboard, and send to scoring system</a:t>
+            </a:r>
+          </a:p>
+          <a:p>
+            <a:r>
+              <a:rPr lang="en-US" dirty="0"/>
+              <a:t>Scoring system will receive update and calculate statistics and score</a:t>
+            </a:r>
+          </a:p>
+          <a:p>
+            <a:pPr lvl="1"/>
+            <a:r>
+              <a:rPr lang="en-US" dirty="0"/>
+              <a:t>Will upload to database and update live hit map for viewing on user interface and mobile device</a:t>
+            </a:r>
+          </a:p>
+          <a:p>
+            <a:r>
+              <a:rPr lang="en-US" dirty="0"/>
+              <a:t>System will repeat until winner is declared or game is ended</a:t>
+            </a:r>
+          </a:p>
+          <a:p>
+            <a:r>
+              <a:rPr lang="en-US" dirty="0"/>
+              <a:t>Mobile app will show user statistics and scores</a:t>
+            </a:r>
+          </a:p>
+        </p:txBody>
+      </p:sp>
+    </p:spTree>
+    <p:extLst>
+      <p:ext uri="{BB962C8B-B14F-4D97-AF65-F5344CB8AC3E}">
+        <p14:creationId xmlns:p14="http://schemas.microsoft.com/office/powerpoint/2010/main" val="1234573934"/>
+      </p:ext>
+    </p:extLst>
+  </p:cSld>
+  <p:clrMapOvr>
+    <a:masterClrMapping/>
+  </p:clrMapOvr>
+</p:sld>
+</file>
+
+<file path=ppt/slides/slide6.xml><?xml version="1.0" encoding="utf-8"?>
+<p:sld xmlns:a="http://schemas.openxmlformats.org/drawingml/2006/main" xmlns:r="http://schemas.openxmlformats.org/officeDocument/2006/relationships" xmlns:p="http://schemas.openxmlformats.org/presentationml/2006/main">
+  <p:cSld>
+    <p:spTree>
+      <p:nvGrpSpPr>
+        <p:cNvPr id="1" name=""/>
+        <p:cNvGrpSpPr/>
+        <p:nvPr/>
+      </p:nvGrpSpPr>
+      <p:grpSpPr>
+        <a:xfrm>
+          <a:off x="0" y="0"/>
+          <a:ext cx="0" cy="0"/>
+          <a:chOff x="0" y="0"/>
+          <a:chExt cx="0" cy="0"/>
+        </a:xfrm>
+      </p:grpSpPr>
+      <p:sp>
+        <p:nvSpPr>
+          <p:cNvPr id="2" name="Title 1">
+            <a:extLst>
+              <a:ext uri="{FF2B5EF4-FFF2-40B4-BE49-F238E27FC236}">
+                <a16:creationId xmlns:a16="http://schemas.microsoft.com/office/drawing/2014/main" id="{F619A4C6-9838-D3C6-5418-E549960DDCEC}"/>
+              </a:ext>
+            </a:extLst>
+          </p:cNvPr>
+          <p:cNvSpPr>
+            <a:spLocks noGrp="1"/>
+          </p:cNvSpPr>
+          <p:nvPr>
+            <p:ph type="title"/>
+          </p:nvPr>
+        </p:nvSpPr>
+        <p:spPr/>
+        <p:txBody>
+          <a:bodyPr/>
+          <a:lstStyle/>
+          <a:p>
+            <a:r>
+              <a:rPr lang="en-US" dirty="0"/>
+              <a:t>Functional Flow</a:t>
+            </a:r>
+          </a:p>
+        </p:txBody>
+      </p:sp>
+      <p:pic>
+        <p:nvPicPr>
+          <p:cNvPr id="4" name="Picture 3" descr="A diagram of a flowchart">
+            <a:extLst>
+              <a:ext uri="{FF2B5EF4-FFF2-40B4-BE49-F238E27FC236}">
+                <a16:creationId xmlns:a16="http://schemas.microsoft.com/office/drawing/2014/main" id="{D354303D-D174-4F75-6AAB-B10D0DED037A}"/>
+              </a:ext>
+            </a:extLst>
+          </p:cNvPr>
+          <p:cNvPicPr>
+            <a:picLocks noChangeAspect="1"/>
+          </p:cNvPicPr>
+          <p:nvPr/>
+        </p:nvPicPr>
+        <p:blipFill>
+          <a:blip r:embed="rId2">
+            <a:extLst>
+              <a:ext uri="{28A0092B-C50C-407E-A947-70E740481C1C}">
+                <a14:useLocalDpi xmlns:a14="http://schemas.microsoft.com/office/drawing/2010/main" val="0"/>
+              </a:ext>
+            </a:extLst>
+          </a:blip>
+          <a:stretch>
+            <a:fillRect/>
+          </a:stretch>
+        </p:blipFill>
+        <p:spPr>
+          <a:xfrm>
+            <a:off x="0" y="1534196"/>
+            <a:ext cx="12192000" cy="5323804"/>
+          </a:xfrm>
+          <a:prstGeom prst="rect">
+            <a:avLst/>
+          </a:prstGeom>
+        </p:spPr>
+      </p:pic>
+    </p:spTree>
+    <p:extLst>
+      <p:ext uri="{BB962C8B-B14F-4D97-AF65-F5344CB8AC3E}">
+        <p14:creationId xmlns:p14="http://schemas.microsoft.com/office/powerpoint/2010/main" val="3333570306"/>
+      </p:ext>
+    </p:extLst>
+  </p:cSld>
+  <p:clrMapOvr>
+    <a:masterClrMapping/>
+  </p:clrMapOvr>
+</p:sld>
+</file>
+
+<file path=ppt/slides/slide7.xml><?xml version="1.0" encoding="utf-8"?>
+<p:sld xmlns:a="http://schemas.openxmlformats.org/drawingml/2006/main" xmlns:r="http://schemas.openxmlformats.org/officeDocument/2006/relationships" xmlns:p="http://schemas.openxmlformats.org/presentationml/2006/main">
+  <p:cSld>
+    <p:spTree>
+      <p:nvGrpSpPr>
+        <p:cNvPr id="1" name=""/>
+        <p:cNvGrpSpPr/>
+        <p:nvPr/>
+      </p:nvGrpSpPr>
+      <p:grpSpPr>
+        <a:xfrm>
+          <a:off x="0" y="0"/>
+          <a:ext cx="0" cy="0"/>
+          <a:chOff x="0" y="0"/>
+          <a:chExt cx="0" cy="0"/>
+        </a:xfrm>
+      </p:grpSpPr>
+      <p:sp>
+        <p:nvSpPr>
+          <p:cNvPr id="2" name="Title 1">
+            <a:extLst>
+              <a:ext uri="{FF2B5EF4-FFF2-40B4-BE49-F238E27FC236}">
+                <a16:creationId xmlns:a16="http://schemas.microsoft.com/office/drawing/2014/main" id="{5829217E-BB1C-6A60-B832-A026365FFA1D}"/>
+              </a:ext>
+            </a:extLst>
+          </p:cNvPr>
+          <p:cNvSpPr>
+            <a:spLocks noGrp="1"/>
+          </p:cNvSpPr>
+          <p:nvPr>
+            <p:ph type="title"/>
+          </p:nvPr>
+        </p:nvSpPr>
+        <p:spPr/>
+        <p:txBody>
+          <a:bodyPr/>
+          <a:lstStyle/>
+          <a:p>
+            <a:r>
+              <a:rPr lang="en-US" dirty="0"/>
+              <a:t>State Machines</a:t>
+            </a:r>
+          </a:p>
+        </p:txBody>
+      </p:sp>
+      <p:pic>
+        <p:nvPicPr>
+          <p:cNvPr id="4" name="Picture 3" descr="A diagram of a game">
+            <a:extLst>
+              <a:ext uri="{FF2B5EF4-FFF2-40B4-BE49-F238E27FC236}">
+                <a16:creationId xmlns:a16="http://schemas.microsoft.com/office/drawing/2014/main" id="{971FB472-7BC0-4171-40A3-F9DEE77B6DB0}"/>
+              </a:ext>
+            </a:extLst>
+          </p:cNvPr>
+          <p:cNvPicPr>
+            <a:picLocks noChangeAspect="1"/>
+          </p:cNvPicPr>
+          <p:nvPr/>
+        </p:nvPicPr>
+        <p:blipFill>
+          <a:blip r:embed="rId2">
+            <a:extLst>
+              <a:ext uri="{28A0092B-C50C-407E-A947-70E740481C1C}">
+                <a14:useLocalDpi xmlns:a14="http://schemas.microsoft.com/office/drawing/2010/main" val="0"/>
+              </a:ext>
+            </a:extLst>
+          </a:blip>
+          <a:stretch>
+            <a:fillRect/>
+          </a:stretch>
+        </p:blipFill>
+        <p:spPr>
+          <a:xfrm>
+            <a:off x="213681" y="2007336"/>
+            <a:ext cx="6891643" cy="3271934"/>
+          </a:xfrm>
+          <a:prstGeom prst="rect">
+            <a:avLst/>
+          </a:prstGeom>
+        </p:spPr>
+      </p:pic>
+      <p:pic>
+        <p:nvPicPr>
+          <p:cNvPr id="3" name="Picture 2" descr="A diagram of a diagram&#10;&#10;Description automatically generated">
+            <a:extLst>
+              <a:ext uri="{FF2B5EF4-FFF2-40B4-BE49-F238E27FC236}">
+                <a16:creationId xmlns:a16="http://schemas.microsoft.com/office/drawing/2014/main" id="{3F9EB007-EDDD-01E7-FED2-60E1EB9D6BFC}"/>
+              </a:ext>
+            </a:extLst>
+          </p:cNvPr>
+          <p:cNvPicPr>
+            <a:picLocks noChangeAspect="1"/>
+          </p:cNvPicPr>
+          <p:nvPr/>
+        </p:nvPicPr>
+        <p:blipFill>
+          <a:blip r:embed="rId3">
+            <a:extLst>
+              <a:ext uri="{28A0092B-C50C-407E-A947-70E740481C1C}">
+                <a14:useLocalDpi xmlns:a14="http://schemas.microsoft.com/office/drawing/2010/main" val="0"/>
+              </a:ext>
+            </a:extLst>
+          </a:blip>
+          <a:stretch>
+            <a:fillRect/>
+          </a:stretch>
+        </p:blipFill>
+        <p:spPr>
+          <a:xfrm>
+            <a:off x="7379047" y="2004339"/>
+            <a:ext cx="2606579" cy="3274931"/>
+          </a:xfrm>
+          <a:prstGeom prst="rect">
+            <a:avLst/>
+          </a:prstGeom>
+        </p:spPr>
+      </p:pic>
+      <p:pic>
+        <p:nvPicPr>
+          <p:cNvPr id="6" name="Picture 5" descr="A diagram of a process&#10;&#10;Description automatically generated">
+            <a:extLst>
+              <a:ext uri="{FF2B5EF4-FFF2-40B4-BE49-F238E27FC236}">
+                <a16:creationId xmlns:a16="http://schemas.microsoft.com/office/drawing/2014/main" id="{FAEA9D3B-263D-64EC-5783-68D295B52008}"/>
+              </a:ext>
+            </a:extLst>
+          </p:cNvPr>
+          <p:cNvPicPr>
+            <a:picLocks noChangeAspect="1"/>
+          </p:cNvPicPr>
+          <p:nvPr/>
+        </p:nvPicPr>
+        <p:blipFill>
+          <a:blip r:embed="rId4">
+            <a:extLst>
+              <a:ext uri="{28A0092B-C50C-407E-A947-70E740481C1C}">
+                <a14:useLocalDpi xmlns:a14="http://schemas.microsoft.com/office/drawing/2010/main" val="0"/>
+              </a:ext>
+            </a:extLst>
+          </a:blip>
+          <a:stretch>
+            <a:fillRect/>
+          </a:stretch>
+        </p:blipFill>
+        <p:spPr>
+          <a:xfrm>
+            <a:off x="10259350" y="2004339"/>
+            <a:ext cx="1718969" cy="3274931"/>
+          </a:xfrm>
+          <a:prstGeom prst="rect">
+            <a:avLst/>
+          </a:prstGeom>
+        </p:spPr>
+      </p:pic>
+      <p:sp>
+        <p:nvSpPr>
+          <p:cNvPr id="8" name="Rectangle: Rounded Corners 7">
+            <a:extLst>
+              <a:ext uri="{FF2B5EF4-FFF2-40B4-BE49-F238E27FC236}">
+                <a16:creationId xmlns:a16="http://schemas.microsoft.com/office/drawing/2014/main" id="{C8A31BB6-F0E8-CB6C-1053-D5D8E3272864}"/>
+              </a:ext>
+            </a:extLst>
+          </p:cNvPr>
+          <p:cNvSpPr/>
+          <p:nvPr/>
+        </p:nvSpPr>
+        <p:spPr>
+          <a:xfrm>
+            <a:off x="1098795" y="6242637"/>
+            <a:ext cx="9994409" cy="572303"/>
+          </a:xfrm>
+          <a:prstGeom prst="roundRect">
+            <a:avLst/>
+          </a:prstGeom>
+        </p:spPr>
+        <p:style>
+          <a:lnRef idx="1">
+            <a:schemeClr val="accent1"/>
+          </a:lnRef>
+          <a:fillRef idx="2">
+            <a:schemeClr val="accent1"/>
+          </a:fillRef>
+          <a:effectRef idx="1">
+            <a:schemeClr val="accent1"/>
+          </a:effectRef>
+          <a:fontRef idx="minor">
+            <a:schemeClr val="dk1"/>
+          </a:fontRef>
+        </p:style>
+        <p:txBody>
+          <a:bodyPr rtlCol="0" anchor="ctr"/>
+          <a:lstStyle/>
+          <a:p>
+            <a:pPr algn="ctr"/>
+            <a:r>
+              <a:rPr lang="en-US" sz="2800" dirty="0"/>
+              <a:t>Scoring and imaging state machines dependent on each other</a:t>
+            </a:r>
+          </a:p>
+        </p:txBody>
+      </p:sp>
+    </p:spTree>
+    <p:extLst>
+      <p:ext uri="{BB962C8B-B14F-4D97-AF65-F5344CB8AC3E}">
+        <p14:creationId xmlns:p14="http://schemas.microsoft.com/office/powerpoint/2010/main" val="2337112987"/>
+      </p:ext>
+    </p:extLst>
+  </p:cSld>
+  <p:clrMapOvr>
+    <a:masterClrMapping/>
+  </p:clrMapOvr>
+</p:sld>
+</file>
+
+<file path=ppt/slides/slide8.xml><?xml version="1.0" encoding="utf-8"?>
+<p:sld xmlns:a="http://schemas.openxmlformats.org/drawingml/2006/main" xmlns:r="http://schemas.openxmlformats.org/officeDocument/2006/relationships" xmlns:p="http://schemas.openxmlformats.org/presentationml/2006/main">
+  <p:cSld>
+    <p:spTree>
+      <p:nvGrpSpPr>
+        <p:cNvPr id="1" name=""/>
+        <p:cNvGrpSpPr/>
+        <p:nvPr/>
+      </p:nvGrpSpPr>
+      <p:grpSpPr>
+        <a:xfrm>
+          <a:off x="0" y="0"/>
+          <a:ext cx="0" cy="0"/>
+          <a:chOff x="0" y="0"/>
+          <a:chExt cx="0" cy="0"/>
+        </a:xfrm>
+      </p:grpSpPr>
+      <p:sp>
+        <p:nvSpPr>
+          <p:cNvPr id="3" name="Title 2">
+            <a:extLst>
+              <a:ext uri="{FF2B5EF4-FFF2-40B4-BE49-F238E27FC236}">
+                <a16:creationId xmlns:a16="http://schemas.microsoft.com/office/drawing/2014/main" id="{1F208E80-636B-BFE8-2DD4-2949F302529A}"/>
+              </a:ext>
+            </a:extLst>
+          </p:cNvPr>
+          <p:cNvSpPr>
+            <a:spLocks noGrp="1"/>
+          </p:cNvSpPr>
+          <p:nvPr>
+            <p:ph type="title"/>
+          </p:nvPr>
+        </p:nvSpPr>
+        <p:spPr>
+          <a:xfrm>
+            <a:off x="838200" y="2766218"/>
+            <a:ext cx="10515600" cy="1325563"/>
+          </a:xfrm>
+        </p:spPr>
+        <p:txBody>
+          <a:bodyPr>
+            <a:normAutofit/>
+          </a:bodyPr>
+          <a:lstStyle/>
+          <a:p>
+            <a:pPr algn="ctr"/>
+            <a:r>
+              <a:rPr lang="en-US" sz="6000" dirty="0"/>
+              <a:t>Backup</a:t>
+            </a:r>
+          </a:p>
+        </p:txBody>
+      </p:sp>
+    </p:spTree>
+    <p:extLst>
+      <p:ext uri="{BB962C8B-B14F-4D97-AF65-F5344CB8AC3E}">
+        <p14:creationId xmlns:p14="http://schemas.microsoft.com/office/powerpoint/2010/main" val="46388902"/>
+      </p:ext>
+    </p:extLst>
+  </p:cSld>
+  <p:clrMapOvr>
+    <a:masterClrMapping/>
+  </p:clrMapOvr>
+</p:sld>
+</file>
+
+<file path=ppt/slides/slide9.xml><?xml version="1.0" encoding="utf-8"?>
+<p:sld xmlns:a="http://schemas.openxmlformats.org/drawingml/2006/main" xmlns:r="http://schemas.openxmlformats.org/officeDocument/2006/relationships" xmlns:p="http://schemas.openxmlformats.org/presentationml/2006/main">
+  <p:cSld>
+    <p:spTree>
+      <p:nvGrpSpPr>
+        <p:cNvPr id="1" name=""/>
+        <p:cNvGrpSpPr/>
+        <p:nvPr/>
+      </p:nvGrpSpPr>
+      <p:grpSpPr>
+        <a:xfrm>
+          <a:off x="0" y="0"/>
+          <a:ext cx="0" cy="0"/>
+          <a:chOff x="0" y="0"/>
+          <a:chExt cx="0" cy="0"/>
+        </a:xfrm>
+      </p:grpSpPr>
+      <p:sp>
+        <p:nvSpPr>
+          <p:cNvPr id="2" name="Title 1">
+            <a:extLst>
+              <a:ext uri="{FF2B5EF4-FFF2-40B4-BE49-F238E27FC236}">
+                <a16:creationId xmlns:a16="http://schemas.microsoft.com/office/drawing/2014/main" id="{B3D623C8-8E1B-3FC4-099A-E31712074F02}"/>
+              </a:ext>
+            </a:extLst>
+          </p:cNvPr>
+          <p:cNvSpPr>
+            <a:spLocks noGrp="1"/>
+          </p:cNvSpPr>
+          <p:nvPr>
+            <p:ph type="title"/>
+          </p:nvPr>
+        </p:nvSpPr>
+        <p:spPr/>
+        <p:txBody>
+          <a:bodyPr/>
+          <a:lstStyle/>
+          <a:p>
+            <a:r>
+              <a:rPr lang="en-US"/>
+              <a:t>Concept Diagram</a:t>
+            </a:r>
+            <a:endParaRPr lang="en-US" dirty="0"/>
+          </a:p>
+        </p:txBody>
+      </p:sp>
+      <p:pic>
+        <p:nvPicPr>
+          <p:cNvPr id="9" name="Content Placeholder 8" descr="A diagram of a computer network&#10;&#10;Description automatically generated">
+            <a:extLst>
+              <a:ext uri="{FF2B5EF4-FFF2-40B4-BE49-F238E27FC236}">
+                <a16:creationId xmlns:a16="http://schemas.microsoft.com/office/drawing/2014/main" id="{52626EE7-D42D-6FA3-C209-35D4A7F5273D}"/>
+              </a:ext>
+            </a:extLst>
+          </p:cNvPr>
+          <p:cNvPicPr>
+            <a:picLocks noGrp="1" noChangeAspect="1"/>
+          </p:cNvPicPr>
+          <p:nvPr>
+            <p:ph idx="4294967295"/>
+          </p:nvPr>
+        </p:nvPicPr>
+        <p:blipFill>
+          <a:blip r:embed="rId2">
+            <a:extLst>
+              <a:ext uri="{28A0092B-C50C-407E-A947-70E740481C1C}">
+                <a14:useLocalDpi xmlns:a14="http://schemas.microsoft.com/office/drawing/2010/main" val="0"/>
+              </a:ext>
+            </a:extLst>
+          </a:blip>
+          <a:stretch>
+            <a:fillRect/>
+          </a:stretch>
+        </p:blipFill>
+        <p:spPr>
+          <a:xfrm>
+            <a:off x="2955925" y="1825625"/>
+            <a:ext cx="6280150" cy="4351338"/>
+          </a:xfrm>
+        </p:spPr>
+      </p:pic>
+      <p:sp>
+        <p:nvSpPr>
+          <p:cNvPr id="11" name="TextBox 10">
+            <a:extLst>
+              <a:ext uri="{FF2B5EF4-FFF2-40B4-BE49-F238E27FC236}">
+                <a16:creationId xmlns:a16="http://schemas.microsoft.com/office/drawing/2014/main" id="{94BFEE93-D2A9-2CA5-3F22-189C06E5D3E4}"/>
+              </a:ext>
+            </a:extLst>
+          </p:cNvPr>
+          <p:cNvSpPr txBox="1"/>
+          <p:nvPr/>
+        </p:nvSpPr>
+        <p:spPr>
+          <a:xfrm>
+            <a:off x="5929313" y="5172076"/>
+            <a:ext cx="1809750" cy="923330"/>
+          </a:xfrm>
+          <a:prstGeom prst="rect">
+            <a:avLst/>
+          </a:prstGeom>
+          <a:noFill/>
+        </p:spPr>
+        <p:txBody>
+          <a:bodyPr wrap="square" rtlCol="0">
+            <a:spAutoFit/>
+          </a:bodyPr>
+          <a:lstStyle/>
+          <a:p>
+            <a:pPr algn="ctr"/>
+            <a:r>
+              <a:rPr lang="en-US" dirty="0"/>
+              <a:t>User will select player when ready to throw</a:t>
+            </a:r>
+          </a:p>
+        </p:txBody>
+      </p:sp>
+      <p:sp>
+        <p:nvSpPr>
+          <p:cNvPr id="13" name="TextBox 12">
+            <a:extLst>
+              <a:ext uri="{FF2B5EF4-FFF2-40B4-BE49-F238E27FC236}">
+                <a16:creationId xmlns:a16="http://schemas.microsoft.com/office/drawing/2014/main" id="{360EC8A1-010F-3433-49CA-1375F604A15F}"/>
+              </a:ext>
+            </a:extLst>
+          </p:cNvPr>
+          <p:cNvSpPr txBox="1"/>
+          <p:nvPr/>
+        </p:nvSpPr>
+        <p:spPr>
+          <a:xfrm>
+            <a:off x="1223962" y="1876426"/>
+            <a:ext cx="2128837" cy="923330"/>
+          </a:xfrm>
+          <a:prstGeom prst="rect">
+            <a:avLst/>
+          </a:prstGeom>
+          <a:noFill/>
+        </p:spPr>
+        <p:txBody>
+          <a:bodyPr wrap="square" rtlCol="0">
+            <a:spAutoFit/>
+          </a:bodyPr>
+          <a:lstStyle/>
+          <a:p>
+            <a:pPr algn="ctr"/>
+            <a:r>
+              <a:rPr lang="en-US" dirty="0"/>
+              <a:t>Jetson will use CV to produce dart position and score</a:t>
+            </a:r>
+          </a:p>
+        </p:txBody>
+      </p:sp>
+      <p:sp>
+        <p:nvSpPr>
+          <p:cNvPr id="14" name="TextBox 13">
+            <a:extLst>
+              <a:ext uri="{FF2B5EF4-FFF2-40B4-BE49-F238E27FC236}">
+                <a16:creationId xmlns:a16="http://schemas.microsoft.com/office/drawing/2014/main" id="{5175ACCA-14E8-6008-4F2F-B7A7EBDE2E2D}"/>
+              </a:ext>
+            </a:extLst>
+          </p:cNvPr>
+          <p:cNvSpPr txBox="1"/>
+          <p:nvPr/>
+        </p:nvSpPr>
+        <p:spPr>
+          <a:xfrm>
+            <a:off x="509588" y="3539629"/>
+            <a:ext cx="2843211" cy="923330"/>
+          </a:xfrm>
+          <a:prstGeom prst="rect">
+            <a:avLst/>
+          </a:prstGeom>
+          <a:noFill/>
+        </p:spPr>
+        <p:txBody>
+          <a:bodyPr wrap="square" rtlCol="0">
+            <a:spAutoFit/>
+          </a:bodyPr>
+          <a:lstStyle/>
+          <a:p>
+            <a:pPr algn="ctr"/>
+            <a:r>
+              <a:rPr lang="en-US" dirty="0"/>
+              <a:t>Pi will receive message from Jetson when position has been identified</a:t>
+            </a:r>
+          </a:p>
+        </p:txBody>
+      </p:sp>
+      <p:sp>
+        <p:nvSpPr>
+          <p:cNvPr id="15" name="TextBox 14">
+            <a:extLst>
+              <a:ext uri="{FF2B5EF4-FFF2-40B4-BE49-F238E27FC236}">
+                <a16:creationId xmlns:a16="http://schemas.microsoft.com/office/drawing/2014/main" id="{7A0F2412-4D8D-AC3E-1892-1E0858F8D269}"/>
+              </a:ext>
+            </a:extLst>
+          </p:cNvPr>
+          <p:cNvSpPr txBox="1"/>
+          <p:nvPr/>
+        </p:nvSpPr>
+        <p:spPr>
+          <a:xfrm>
+            <a:off x="9236497" y="3262630"/>
+            <a:ext cx="1809750" cy="1477328"/>
+          </a:xfrm>
+          <a:prstGeom prst="rect">
+            <a:avLst/>
+          </a:prstGeom>
+          <a:noFill/>
+        </p:spPr>
+        <p:txBody>
+          <a:bodyPr wrap="square" rtlCol="0">
+            <a:spAutoFit/>
+          </a:bodyPr>
+          <a:lstStyle/>
+          <a:p>
+            <a:pPr algn="ctr"/>
+            <a:r>
+              <a:rPr lang="en-US" dirty="0"/>
+              <a:t>User can use mobile app to view statistics and current score</a:t>
+            </a:r>
+          </a:p>
+        </p:txBody>
+      </p:sp>
+    </p:spTree>
+    <p:extLst>
+      <p:ext uri="{BB962C8B-B14F-4D97-AF65-F5344CB8AC3E}">
+        <p14:creationId xmlns:p14="http://schemas.microsoft.com/office/powerpoint/2010/main" val="2620406225"/>
       </p:ext>
     </p:extLst>
   </p:cSld>

</xml_diff>

<commit_message>
Create interface diagram (#10)
</commit_message>
<xml_diff>
--- a/documentation/Dart_Scoring_System_PDR.pptx
+++ b/documentation/Dart_Scoring_System_PDR.pptx
@@ -4,6 +4,9 @@
   <p:sldMasterIdLst>
     <p:sldMasterId id="2147483648" r:id="rId1"/>
   </p:sldMasterIdLst>
+  <p:notesMasterIdLst>
+    <p:notesMasterId r:id="rId12"/>
+  </p:notesMasterIdLst>
   <p:sldIdLst>
     <p:sldId id="256" r:id="rId2"/>
     <p:sldId id="259" r:id="rId3"/>
@@ -12,8 +15,9 @@
     <p:sldId id="261" r:id="rId6"/>
     <p:sldId id="262" r:id="rId7"/>
     <p:sldId id="266" r:id="rId8"/>
-    <p:sldId id="264" r:id="rId9"/>
-    <p:sldId id="258" r:id="rId10"/>
+    <p:sldId id="267" r:id="rId9"/>
+    <p:sldId id="264" r:id="rId10"/>
+    <p:sldId id="258" r:id="rId11"/>
   </p:sldIdLst>
   <p:sldSz cx="12192000" cy="6858000"/>
   <p:notesSz cx="6858000" cy="9144000"/>
@@ -120,6 +124,355 @@
 </p:presentation>
 </file>
 
+<file path=ppt/notesMasters/notesMaster1.xml><?xml version="1.0" encoding="utf-8"?>
+<p:notesMaster xmlns:a="http://schemas.openxmlformats.org/drawingml/2006/main" xmlns:r="http://schemas.openxmlformats.org/officeDocument/2006/relationships" xmlns:p="http://schemas.openxmlformats.org/presentationml/2006/main">
+  <p:cSld>
+    <p:bg>
+      <p:bgRef idx="1001">
+        <a:schemeClr val="bg1"/>
+      </p:bgRef>
+    </p:bg>
+    <p:spTree>
+      <p:nvGrpSpPr>
+        <p:cNvPr id="1" name=""/>
+        <p:cNvGrpSpPr/>
+        <p:nvPr/>
+      </p:nvGrpSpPr>
+      <p:grpSpPr>
+        <a:xfrm>
+          <a:off x="0" y="0"/>
+          <a:ext cx="0" cy="0"/>
+          <a:chOff x="0" y="0"/>
+          <a:chExt cx="0" cy="0"/>
+        </a:xfrm>
+      </p:grpSpPr>
+      <p:sp>
+        <p:nvSpPr>
+          <p:cNvPr id="2" name="Header Placeholder 1"/>
+          <p:cNvSpPr>
+            <a:spLocks noGrp="1"/>
+          </p:cNvSpPr>
+          <p:nvPr>
+            <p:ph type="hdr" sz="quarter"/>
+          </p:nvPr>
+        </p:nvSpPr>
+        <p:spPr>
+          <a:xfrm>
+            <a:off x="0" y="0"/>
+            <a:ext cx="2971800" cy="458788"/>
+          </a:xfrm>
+          <a:prstGeom prst="rect">
+            <a:avLst/>
+          </a:prstGeom>
+        </p:spPr>
+        <p:txBody>
+          <a:bodyPr vert="horz" lIns="91440" tIns="45720" rIns="91440" bIns="45720" rtlCol="0"/>
+          <a:lstStyle>
+            <a:lvl1pPr algn="l">
+              <a:defRPr sz="1200"/>
+            </a:lvl1pPr>
+          </a:lstStyle>
+          <a:p>
+            <a:endParaRPr lang="en-US"/>
+          </a:p>
+        </p:txBody>
+      </p:sp>
+      <p:sp>
+        <p:nvSpPr>
+          <p:cNvPr id="3" name="Date Placeholder 2"/>
+          <p:cNvSpPr>
+            <a:spLocks noGrp="1"/>
+          </p:cNvSpPr>
+          <p:nvPr>
+            <p:ph type="dt" idx="1"/>
+          </p:nvPr>
+        </p:nvSpPr>
+        <p:spPr>
+          <a:xfrm>
+            <a:off x="3884613" y="0"/>
+            <a:ext cx="2971800" cy="458788"/>
+          </a:xfrm>
+          <a:prstGeom prst="rect">
+            <a:avLst/>
+          </a:prstGeom>
+        </p:spPr>
+        <p:txBody>
+          <a:bodyPr vert="horz" lIns="91440" tIns="45720" rIns="91440" bIns="45720" rtlCol="0"/>
+          <a:lstStyle>
+            <a:lvl1pPr algn="r">
+              <a:defRPr sz="1200"/>
+            </a:lvl1pPr>
+          </a:lstStyle>
+          <a:p>
+            <a:fld id="{DBE2B285-76B0-43C0-8A08-AA36D616CFE8}" type="datetimeFigureOut">
+              <a:rPr lang="en-US" smtClean="0"/>
+              <a:t>9/16/2023</a:t>
+            </a:fld>
+            <a:endParaRPr lang="en-US"/>
+          </a:p>
+        </p:txBody>
+      </p:sp>
+      <p:sp>
+        <p:nvSpPr>
+          <p:cNvPr id="4" name="Slide Image Placeholder 3"/>
+          <p:cNvSpPr>
+            <a:spLocks noGrp="1" noRot="1" noChangeAspect="1"/>
+          </p:cNvSpPr>
+          <p:nvPr>
+            <p:ph type="sldImg" idx="2"/>
+          </p:nvPr>
+        </p:nvSpPr>
+        <p:spPr>
+          <a:xfrm>
+            <a:off x="685800" y="1143000"/>
+            <a:ext cx="5486400" cy="3086100"/>
+          </a:xfrm>
+          <a:prstGeom prst="rect">
+            <a:avLst/>
+          </a:prstGeom>
+          <a:noFill/>
+          <a:ln w="12700">
+            <a:solidFill>
+              <a:prstClr val="black"/>
+            </a:solidFill>
+          </a:ln>
+        </p:spPr>
+        <p:txBody>
+          <a:bodyPr vert="horz" lIns="91440" tIns="45720" rIns="91440" bIns="45720" rtlCol="0" anchor="ctr"/>
+          <a:lstStyle/>
+          <a:p>
+            <a:endParaRPr lang="en-US"/>
+          </a:p>
+        </p:txBody>
+      </p:sp>
+      <p:sp>
+        <p:nvSpPr>
+          <p:cNvPr id="5" name="Notes Placeholder 4"/>
+          <p:cNvSpPr>
+            <a:spLocks noGrp="1"/>
+          </p:cNvSpPr>
+          <p:nvPr>
+            <p:ph type="body" sz="quarter" idx="3"/>
+          </p:nvPr>
+        </p:nvSpPr>
+        <p:spPr>
+          <a:xfrm>
+            <a:off x="685800" y="4400550"/>
+            <a:ext cx="5486400" cy="3600450"/>
+          </a:xfrm>
+          <a:prstGeom prst="rect">
+            <a:avLst/>
+          </a:prstGeom>
+        </p:spPr>
+        <p:txBody>
+          <a:bodyPr vert="horz" lIns="91440" tIns="45720" rIns="91440" bIns="45720" rtlCol="0"/>
+          <a:lstStyle/>
+          <a:p>
+            <a:pPr lvl="0"/>
+            <a:r>
+              <a:rPr lang="en-US"/>
+              <a:t>Click to edit Master text styles</a:t>
+            </a:r>
+          </a:p>
+          <a:p>
+            <a:pPr lvl="1"/>
+            <a:r>
+              <a:rPr lang="en-US"/>
+              <a:t>Second level</a:t>
+            </a:r>
+          </a:p>
+          <a:p>
+            <a:pPr lvl="2"/>
+            <a:r>
+              <a:rPr lang="en-US"/>
+              <a:t>Third level</a:t>
+            </a:r>
+          </a:p>
+          <a:p>
+            <a:pPr lvl="3"/>
+            <a:r>
+              <a:rPr lang="en-US"/>
+              <a:t>Fourth level</a:t>
+            </a:r>
+          </a:p>
+          <a:p>
+            <a:pPr lvl="4"/>
+            <a:r>
+              <a:rPr lang="en-US"/>
+              <a:t>Fifth level</a:t>
+            </a:r>
+          </a:p>
+        </p:txBody>
+      </p:sp>
+      <p:sp>
+        <p:nvSpPr>
+          <p:cNvPr id="6" name="Footer Placeholder 5"/>
+          <p:cNvSpPr>
+            <a:spLocks noGrp="1"/>
+          </p:cNvSpPr>
+          <p:nvPr>
+            <p:ph type="ftr" sz="quarter" idx="4"/>
+          </p:nvPr>
+        </p:nvSpPr>
+        <p:spPr>
+          <a:xfrm>
+            <a:off x="0" y="8685213"/>
+            <a:ext cx="2971800" cy="458787"/>
+          </a:xfrm>
+          <a:prstGeom prst="rect">
+            <a:avLst/>
+          </a:prstGeom>
+        </p:spPr>
+        <p:txBody>
+          <a:bodyPr vert="horz" lIns="91440" tIns="45720" rIns="91440" bIns="45720" rtlCol="0" anchor="b"/>
+          <a:lstStyle>
+            <a:lvl1pPr algn="l">
+              <a:defRPr sz="1200"/>
+            </a:lvl1pPr>
+          </a:lstStyle>
+          <a:p>
+            <a:endParaRPr lang="en-US"/>
+          </a:p>
+        </p:txBody>
+      </p:sp>
+      <p:sp>
+        <p:nvSpPr>
+          <p:cNvPr id="7" name="Slide Number Placeholder 6"/>
+          <p:cNvSpPr>
+            <a:spLocks noGrp="1"/>
+          </p:cNvSpPr>
+          <p:nvPr>
+            <p:ph type="sldNum" sz="quarter" idx="5"/>
+          </p:nvPr>
+        </p:nvSpPr>
+        <p:spPr>
+          <a:xfrm>
+            <a:off x="3884613" y="8685213"/>
+            <a:ext cx="2971800" cy="458787"/>
+          </a:xfrm>
+          <a:prstGeom prst="rect">
+            <a:avLst/>
+          </a:prstGeom>
+        </p:spPr>
+        <p:txBody>
+          <a:bodyPr vert="horz" lIns="91440" tIns="45720" rIns="91440" bIns="45720" rtlCol="0" anchor="b"/>
+          <a:lstStyle>
+            <a:lvl1pPr algn="r">
+              <a:defRPr sz="1200"/>
+            </a:lvl1pPr>
+          </a:lstStyle>
+          <a:p>
+            <a:fld id="{9D5975D1-7313-4A58-B38C-8E658BCBCAC2}" type="slidenum">
+              <a:rPr lang="en-US" smtClean="0"/>
+              <a:t>‹#›</a:t>
+            </a:fld>
+            <a:endParaRPr lang="en-US"/>
+          </a:p>
+        </p:txBody>
+      </p:sp>
+    </p:spTree>
+    <p:extLst>
+      <p:ext uri="{BB962C8B-B14F-4D97-AF65-F5344CB8AC3E}">
+        <p14:creationId xmlns:p14="http://schemas.microsoft.com/office/powerpoint/2010/main" val="3148866093"/>
+      </p:ext>
+    </p:extLst>
+  </p:cSld>
+  <p:clrMap bg1="lt1" tx1="dk1" bg2="lt2" tx2="dk2" accent1="accent1" accent2="accent2" accent3="accent3" accent4="accent4" accent5="accent5" accent6="accent6" hlink="hlink" folHlink="folHlink"/>
+  <p:notesStyle>
+    <a:lvl1pPr marL="0" algn="l" defTabSz="914400" rtl="0" eaLnBrk="1" latinLnBrk="0" hangingPunct="1">
+      <a:defRPr sz="1200" kern="1200">
+        <a:solidFill>
+          <a:schemeClr val="tx1"/>
+        </a:solidFill>
+        <a:latin typeface="+mn-lt"/>
+        <a:ea typeface="+mn-ea"/>
+        <a:cs typeface="+mn-cs"/>
+      </a:defRPr>
+    </a:lvl1pPr>
+    <a:lvl2pPr marL="457200" algn="l" defTabSz="914400" rtl="0" eaLnBrk="1" latinLnBrk="0" hangingPunct="1">
+      <a:defRPr sz="1200" kern="1200">
+        <a:solidFill>
+          <a:schemeClr val="tx1"/>
+        </a:solidFill>
+        <a:latin typeface="+mn-lt"/>
+        <a:ea typeface="+mn-ea"/>
+        <a:cs typeface="+mn-cs"/>
+      </a:defRPr>
+    </a:lvl2pPr>
+    <a:lvl3pPr marL="914400" algn="l" defTabSz="914400" rtl="0" eaLnBrk="1" latinLnBrk="0" hangingPunct="1">
+      <a:defRPr sz="1200" kern="1200">
+        <a:solidFill>
+          <a:schemeClr val="tx1"/>
+        </a:solidFill>
+        <a:latin typeface="+mn-lt"/>
+        <a:ea typeface="+mn-ea"/>
+        <a:cs typeface="+mn-cs"/>
+      </a:defRPr>
+    </a:lvl3pPr>
+    <a:lvl4pPr marL="1371600" algn="l" defTabSz="914400" rtl="0" eaLnBrk="1" latinLnBrk="0" hangingPunct="1">
+      <a:defRPr sz="1200" kern="1200">
+        <a:solidFill>
+          <a:schemeClr val="tx1"/>
+        </a:solidFill>
+        <a:latin typeface="+mn-lt"/>
+        <a:ea typeface="+mn-ea"/>
+        <a:cs typeface="+mn-cs"/>
+      </a:defRPr>
+    </a:lvl4pPr>
+    <a:lvl5pPr marL="1828800" algn="l" defTabSz="914400" rtl="0" eaLnBrk="1" latinLnBrk="0" hangingPunct="1">
+      <a:defRPr sz="1200" kern="1200">
+        <a:solidFill>
+          <a:schemeClr val="tx1"/>
+        </a:solidFill>
+        <a:latin typeface="+mn-lt"/>
+        <a:ea typeface="+mn-ea"/>
+        <a:cs typeface="+mn-cs"/>
+      </a:defRPr>
+    </a:lvl5pPr>
+    <a:lvl6pPr marL="2286000" algn="l" defTabSz="914400" rtl="0" eaLnBrk="1" latinLnBrk="0" hangingPunct="1">
+      <a:defRPr sz="1200" kern="1200">
+        <a:solidFill>
+          <a:schemeClr val="tx1"/>
+        </a:solidFill>
+        <a:latin typeface="+mn-lt"/>
+        <a:ea typeface="+mn-ea"/>
+        <a:cs typeface="+mn-cs"/>
+      </a:defRPr>
+    </a:lvl6pPr>
+    <a:lvl7pPr marL="2743200" algn="l" defTabSz="914400" rtl="0" eaLnBrk="1" latinLnBrk="0" hangingPunct="1">
+      <a:defRPr sz="1200" kern="1200">
+        <a:solidFill>
+          <a:schemeClr val="tx1"/>
+        </a:solidFill>
+        <a:latin typeface="+mn-lt"/>
+        <a:ea typeface="+mn-ea"/>
+        <a:cs typeface="+mn-cs"/>
+      </a:defRPr>
+    </a:lvl7pPr>
+    <a:lvl8pPr marL="3200400" algn="l" defTabSz="914400" rtl="0" eaLnBrk="1" latinLnBrk="0" hangingPunct="1">
+      <a:defRPr sz="1200" kern="1200">
+        <a:solidFill>
+          <a:schemeClr val="tx1"/>
+        </a:solidFill>
+        <a:latin typeface="+mn-lt"/>
+        <a:ea typeface="+mn-ea"/>
+        <a:cs typeface="+mn-cs"/>
+      </a:defRPr>
+    </a:lvl8pPr>
+    <a:lvl9pPr marL="3657600" algn="l" defTabSz="914400" rtl="0" eaLnBrk="1" latinLnBrk="0" hangingPunct="1">
+      <a:defRPr sz="1200" kern="1200">
+        <a:solidFill>
+          <a:schemeClr val="tx1"/>
+        </a:solidFill>
+        <a:latin typeface="+mn-lt"/>
+        <a:ea typeface="+mn-ea"/>
+        <a:cs typeface="+mn-cs"/>
+      </a:defRPr>
+    </a:lvl9pPr>
+  </p:notesStyle>
+</p:notesMaster>
+</file>
+
 <file path=ppt/slideLayouts/slideLayout1.xml><?xml version="1.0" encoding="utf-8"?>
 <p:sldLayout xmlns:a="http://schemas.openxmlformats.org/drawingml/2006/main" xmlns:r="http://schemas.openxmlformats.org/officeDocument/2006/relationships" xmlns:p="http://schemas.openxmlformats.org/presentationml/2006/main" type="title" preserve="1">
   <p:cSld name="Title Slide">
@@ -265,65 +618,73 @@
           <a:bodyPr/>
           <a:lstStyle/>
           <a:p>
-            <a:fld id="{0D2FDF6F-1EA0-4374-A917-9D813E578D69}" type="datetimeFigureOut">
+            <a:r>
+              <a:rPr lang="en-US"/>
+              <a:t>9/18/2023</a:t>
+            </a:r>
+          </a:p>
+        </p:txBody>
+      </p:sp>
+      <p:sp>
+        <p:nvSpPr>
+          <p:cNvPr id="5" name="Footer Placeholder 4">
+            <a:extLst>
+              <a:ext uri="{FF2B5EF4-FFF2-40B4-BE49-F238E27FC236}">
+                <a16:creationId xmlns:a16="http://schemas.microsoft.com/office/drawing/2014/main" id="{2F9068A7-29E2-FE00-3E56-F3F9CCBC65CD}"/>
+              </a:ext>
+            </a:extLst>
+          </p:cNvPr>
+          <p:cNvSpPr>
+            <a:spLocks noGrp="1"/>
+          </p:cNvSpPr>
+          <p:nvPr>
+            <p:ph type="ftr" sz="quarter" idx="11"/>
+          </p:nvPr>
+        </p:nvSpPr>
+        <p:spPr/>
+        <p:txBody>
+          <a:bodyPr/>
+          <a:lstStyle/>
+          <a:p>
+            <a:r>
+              <a:rPr lang="en-US"/>
+              <a:t>Preliminary Design Review</a:t>
+            </a:r>
+            <a:endParaRPr lang="en-US" dirty="0"/>
+          </a:p>
+        </p:txBody>
+      </p:sp>
+      <p:sp>
+        <p:nvSpPr>
+          <p:cNvPr id="6" name="Slide Number Placeholder 5">
+            <a:extLst>
+              <a:ext uri="{FF2B5EF4-FFF2-40B4-BE49-F238E27FC236}">
+                <a16:creationId xmlns:a16="http://schemas.microsoft.com/office/drawing/2014/main" id="{3195BA2F-2975-9EEB-7833-6D6D648B93B5}"/>
+              </a:ext>
+            </a:extLst>
+          </p:cNvPr>
+          <p:cNvSpPr>
+            <a:spLocks noGrp="1"/>
+          </p:cNvSpPr>
+          <p:nvPr>
+            <p:ph type="sldNum" sz="quarter" idx="12"/>
+          </p:nvPr>
+        </p:nvSpPr>
+        <p:spPr/>
+        <p:txBody>
+          <a:bodyPr/>
+          <a:lstStyle>
+            <a:lvl1pPr>
+              <a:defRPr/>
+            </a:lvl1pPr>
+          </a:lstStyle>
+          <a:p>
+            <a:fld id="{92646A98-E420-4F26-8B4C-82C10DB78783}" type="slidenum">
               <a:rPr lang="en-US" smtClean="0"/>
-              <a:t>9/15/2023</a:t>
-            </a:fld>
-            <a:endParaRPr lang="en-US"/>
-          </a:p>
-        </p:txBody>
-      </p:sp>
-      <p:sp>
-        <p:nvSpPr>
-          <p:cNvPr id="5" name="Footer Placeholder 4">
-            <a:extLst>
-              <a:ext uri="{FF2B5EF4-FFF2-40B4-BE49-F238E27FC236}">
-                <a16:creationId xmlns:a16="http://schemas.microsoft.com/office/drawing/2014/main" id="{2F9068A7-29E2-FE00-3E56-F3F9CCBC65CD}"/>
-              </a:ext>
-            </a:extLst>
-          </p:cNvPr>
-          <p:cNvSpPr>
-            <a:spLocks noGrp="1"/>
-          </p:cNvSpPr>
-          <p:nvPr>
-            <p:ph type="ftr" sz="quarter" idx="11"/>
-          </p:nvPr>
-        </p:nvSpPr>
-        <p:spPr/>
-        <p:txBody>
-          <a:bodyPr/>
-          <a:lstStyle/>
-          <a:p>
-            <a:endParaRPr lang="en-US"/>
-          </a:p>
-        </p:txBody>
-      </p:sp>
-      <p:sp>
-        <p:nvSpPr>
-          <p:cNvPr id="6" name="Slide Number Placeholder 5">
-            <a:extLst>
-              <a:ext uri="{FF2B5EF4-FFF2-40B4-BE49-F238E27FC236}">
-                <a16:creationId xmlns:a16="http://schemas.microsoft.com/office/drawing/2014/main" id="{3195BA2F-2975-9EEB-7833-6D6D648B93B5}"/>
-              </a:ext>
-            </a:extLst>
-          </p:cNvPr>
-          <p:cNvSpPr>
-            <a:spLocks noGrp="1"/>
-          </p:cNvSpPr>
-          <p:nvPr>
-            <p:ph type="sldNum" sz="quarter" idx="12"/>
-          </p:nvPr>
-        </p:nvSpPr>
-        <p:spPr/>
-        <p:txBody>
-          <a:bodyPr/>
-          <a:lstStyle/>
-          <a:p>
-            <a:fld id="{932DE7C4-7503-4383-A791-176189BE253C}" type="slidenum">
-              <a:rPr lang="en-US" smtClean="0"/>
+              <a:pPr/>
               <a:t>‹#›</a:t>
             </a:fld>
-            <a:endParaRPr lang="en-US"/>
+            <a:endParaRPr lang="en-US" dirty="0"/>
           </a:p>
         </p:txBody>
       </p:sp>
@@ -463,11 +824,10 @@
           <a:bodyPr/>
           <a:lstStyle/>
           <a:p>
-            <a:fld id="{0D2FDF6F-1EA0-4374-A917-9D813E578D69}" type="datetimeFigureOut">
-              <a:rPr lang="en-US" smtClean="0"/>
-              <a:t>9/15/2023</a:t>
-            </a:fld>
-            <a:endParaRPr lang="en-US"/>
+            <a:r>
+              <a:rPr lang="en-US"/>
+              <a:t>9/18/2023</a:t>
+            </a:r>
           </a:p>
         </p:txBody>
       </p:sp>
@@ -492,7 +852,10 @@
           <a:bodyPr/>
           <a:lstStyle/>
           <a:p>
-            <a:endParaRPr lang="en-US"/>
+            <a:r>
+              <a:rPr lang="en-US"/>
+              <a:t>Preliminary Design Review</a:t>
+            </a:r>
           </a:p>
         </p:txBody>
       </p:sp>
@@ -671,11 +1034,10 @@
           <a:bodyPr/>
           <a:lstStyle/>
           <a:p>
-            <a:fld id="{0D2FDF6F-1EA0-4374-A917-9D813E578D69}" type="datetimeFigureOut">
-              <a:rPr lang="en-US" smtClean="0"/>
-              <a:t>9/15/2023</a:t>
-            </a:fld>
-            <a:endParaRPr lang="en-US"/>
+            <a:r>
+              <a:rPr lang="en-US"/>
+              <a:t>9/18/2023</a:t>
+            </a:r>
           </a:p>
         </p:txBody>
       </p:sp>
@@ -700,7 +1062,10 @@
           <a:bodyPr/>
           <a:lstStyle/>
           <a:p>
-            <a:endParaRPr lang="en-US"/>
+            <a:r>
+              <a:rPr lang="en-US"/>
+              <a:t>Preliminary Design Review</a:t>
+            </a:r>
           </a:p>
         </p:txBody>
       </p:sp>
@@ -869,11 +1234,10 @@
           <a:bodyPr/>
           <a:lstStyle/>
           <a:p>
-            <a:fld id="{0D2FDF6F-1EA0-4374-A917-9D813E578D69}" type="datetimeFigureOut">
-              <a:rPr lang="en-US" smtClean="0"/>
-              <a:t>9/15/2023</a:t>
-            </a:fld>
-            <a:endParaRPr lang="en-US"/>
+            <a:r>
+              <a:rPr lang="en-US"/>
+              <a:t>9/18/2023</a:t>
+            </a:r>
           </a:p>
         </p:txBody>
       </p:sp>
@@ -898,7 +1262,10 @@
           <a:bodyPr/>
           <a:lstStyle/>
           <a:p>
-            <a:endParaRPr lang="en-US"/>
+            <a:r>
+              <a:rPr lang="en-US"/>
+              <a:t>Preliminary Design Review</a:t>
+            </a:r>
           </a:p>
         </p:txBody>
       </p:sp>
@@ -1144,11 +1511,10 @@
           <a:bodyPr/>
           <a:lstStyle/>
           <a:p>
-            <a:fld id="{0D2FDF6F-1EA0-4374-A917-9D813E578D69}" type="datetimeFigureOut">
-              <a:rPr lang="en-US" smtClean="0"/>
-              <a:t>9/15/2023</a:t>
-            </a:fld>
-            <a:endParaRPr lang="en-US"/>
+            <a:r>
+              <a:rPr lang="en-US"/>
+              <a:t>9/18/2023</a:t>
+            </a:r>
           </a:p>
         </p:txBody>
       </p:sp>
@@ -1173,7 +1539,10 @@
           <a:bodyPr/>
           <a:lstStyle/>
           <a:p>
-            <a:endParaRPr lang="en-US"/>
+            <a:r>
+              <a:rPr lang="en-US"/>
+              <a:t>Preliminary Design Review</a:t>
+            </a:r>
           </a:p>
         </p:txBody>
       </p:sp>
@@ -1409,11 +1778,10 @@
           <a:bodyPr/>
           <a:lstStyle/>
           <a:p>
-            <a:fld id="{0D2FDF6F-1EA0-4374-A917-9D813E578D69}" type="datetimeFigureOut">
-              <a:rPr lang="en-US" smtClean="0"/>
-              <a:t>9/15/2023</a:t>
-            </a:fld>
-            <a:endParaRPr lang="en-US"/>
+            <a:r>
+              <a:rPr lang="en-US"/>
+              <a:t>9/18/2023</a:t>
+            </a:r>
           </a:p>
         </p:txBody>
       </p:sp>
@@ -1438,7 +1806,10 @@
           <a:bodyPr/>
           <a:lstStyle/>
           <a:p>
-            <a:endParaRPr lang="en-US"/>
+            <a:r>
+              <a:rPr lang="en-US"/>
+              <a:t>Preliminary Design Review</a:t>
+            </a:r>
           </a:p>
         </p:txBody>
       </p:sp>
@@ -1821,11 +2192,10 @@
           <a:bodyPr/>
           <a:lstStyle/>
           <a:p>
-            <a:fld id="{0D2FDF6F-1EA0-4374-A917-9D813E578D69}" type="datetimeFigureOut">
-              <a:rPr lang="en-US" smtClean="0"/>
-              <a:t>9/15/2023</a:t>
-            </a:fld>
-            <a:endParaRPr lang="en-US"/>
+            <a:r>
+              <a:rPr lang="en-US"/>
+              <a:t>9/18/2023</a:t>
+            </a:r>
           </a:p>
         </p:txBody>
       </p:sp>
@@ -1850,7 +2220,10 @@
           <a:bodyPr/>
           <a:lstStyle/>
           <a:p>
-            <a:endParaRPr lang="en-US"/>
+            <a:r>
+              <a:rPr lang="en-US"/>
+              <a:t>Preliminary Design Review</a:t>
+            </a:r>
           </a:p>
         </p:txBody>
       </p:sp>
@@ -1962,11 +2335,10 @@
           <a:bodyPr/>
           <a:lstStyle/>
           <a:p>
-            <a:fld id="{0D2FDF6F-1EA0-4374-A917-9D813E578D69}" type="datetimeFigureOut">
-              <a:rPr lang="en-US" smtClean="0"/>
-              <a:t>9/15/2023</a:t>
-            </a:fld>
-            <a:endParaRPr lang="en-US"/>
+            <a:r>
+              <a:rPr lang="en-US"/>
+              <a:t>9/18/2023</a:t>
+            </a:r>
           </a:p>
         </p:txBody>
       </p:sp>
@@ -1991,7 +2363,10 @@
           <a:bodyPr/>
           <a:lstStyle/>
           <a:p>
-            <a:endParaRPr lang="en-US"/>
+            <a:r>
+              <a:rPr lang="en-US"/>
+              <a:t>Preliminary Design Review</a:t>
+            </a:r>
           </a:p>
         </p:txBody>
       </p:sp>
@@ -2075,11 +2450,10 @@
           <a:bodyPr/>
           <a:lstStyle/>
           <a:p>
-            <a:fld id="{0D2FDF6F-1EA0-4374-A917-9D813E578D69}" type="datetimeFigureOut">
-              <a:rPr lang="en-US" smtClean="0"/>
-              <a:t>9/15/2023</a:t>
-            </a:fld>
-            <a:endParaRPr lang="en-US"/>
+            <a:r>
+              <a:rPr lang="en-US"/>
+              <a:t>9/18/2023</a:t>
+            </a:r>
           </a:p>
         </p:txBody>
       </p:sp>
@@ -2104,7 +2478,10 @@
           <a:bodyPr/>
           <a:lstStyle/>
           <a:p>
-            <a:endParaRPr lang="en-US"/>
+            <a:r>
+              <a:rPr lang="en-US"/>
+              <a:t>Preliminary Design Review</a:t>
+            </a:r>
           </a:p>
         </p:txBody>
       </p:sp>
@@ -2386,11 +2763,10 @@
           <a:bodyPr/>
           <a:lstStyle/>
           <a:p>
-            <a:fld id="{0D2FDF6F-1EA0-4374-A917-9D813E578D69}" type="datetimeFigureOut">
-              <a:rPr lang="en-US" smtClean="0"/>
-              <a:t>9/15/2023</a:t>
-            </a:fld>
-            <a:endParaRPr lang="en-US"/>
+            <a:r>
+              <a:rPr lang="en-US"/>
+              <a:t>9/18/2023</a:t>
+            </a:r>
           </a:p>
         </p:txBody>
       </p:sp>
@@ -2415,7 +2791,10 @@
           <a:bodyPr/>
           <a:lstStyle/>
           <a:p>
-            <a:endParaRPr lang="en-US"/>
+            <a:r>
+              <a:rPr lang="en-US"/>
+              <a:t>Preliminary Design Review</a:t>
+            </a:r>
           </a:p>
         </p:txBody>
       </p:sp>
@@ -2674,11 +3053,10 @@
           <a:bodyPr/>
           <a:lstStyle/>
           <a:p>
-            <a:fld id="{0D2FDF6F-1EA0-4374-A917-9D813E578D69}" type="datetimeFigureOut">
-              <a:rPr lang="en-US" smtClean="0"/>
-              <a:t>9/15/2023</a:t>
-            </a:fld>
-            <a:endParaRPr lang="en-US"/>
+            <a:r>
+              <a:rPr lang="en-US"/>
+              <a:t>9/18/2023</a:t>
+            </a:r>
           </a:p>
         </p:txBody>
       </p:sp>
@@ -2703,7 +3081,10 @@
           <a:bodyPr/>
           <a:lstStyle/>
           <a:p>
-            <a:endParaRPr lang="en-US"/>
+            <a:r>
+              <a:rPr lang="en-US"/>
+              <a:t>Preliminary Design Review</a:t>
+            </a:r>
           </a:p>
         </p:txBody>
       </p:sp>
@@ -2915,11 +3296,10 @@
             </a:lvl1pPr>
           </a:lstStyle>
           <a:p>
-            <a:fld id="{0D2FDF6F-1EA0-4374-A917-9D813E578D69}" type="datetimeFigureOut">
-              <a:rPr lang="en-US" smtClean="0"/>
-              <a:t>9/15/2023</a:t>
-            </a:fld>
-            <a:endParaRPr lang="en-US"/>
+            <a:r>
+              <a:rPr lang="en-US"/>
+              <a:t>9/18/2023</a:t>
+            </a:r>
           </a:p>
         </p:txBody>
       </p:sp>
@@ -2962,7 +3342,10 @@
             </a:lvl1pPr>
           </a:lstStyle>
           <a:p>
-            <a:endParaRPr lang="en-US"/>
+            <a:r>
+              <a:rPr lang="en-US"/>
+              <a:t>Preliminary Design Review</a:t>
+            </a:r>
           </a:p>
         </p:txBody>
       </p:sp>
@@ -3034,6 +3417,7 @@
     <p:sldLayoutId id="2147483658" r:id="rId10"/>
     <p:sldLayoutId id="2147483659" r:id="rId11"/>
   </p:sldLayoutIdLst>
+  <p:hf hdr="0"/>
   <p:txStyles>
     <p:titleStyle>
       <a:lvl1pPr algn="l" defTabSz="914400" rtl="0" eaLnBrk="1" latinLnBrk="0" hangingPunct="1">
@@ -3385,8 +3769,99 @@
           <a:p>
             <a:r>
               <a:rPr lang="en-US" dirty="0"/>
+              <a:t>EN.525.743 – Embedded Systems Development Laboratory</a:t>
+            </a:r>
+          </a:p>
+          <a:p>
+            <a:r>
+              <a:rPr lang="en-US" dirty="0"/>
               <a:t>Kevin Parlak</a:t>
             </a:r>
+          </a:p>
+        </p:txBody>
+      </p:sp>
+      <p:sp>
+        <p:nvSpPr>
+          <p:cNvPr id="4" name="Date Placeholder 3">
+            <a:extLst>
+              <a:ext uri="{FF2B5EF4-FFF2-40B4-BE49-F238E27FC236}">
+                <a16:creationId xmlns:a16="http://schemas.microsoft.com/office/drawing/2014/main" id="{3D4EC005-19C2-7B36-EA9A-3D45753E8D31}"/>
+              </a:ext>
+            </a:extLst>
+          </p:cNvPr>
+          <p:cNvSpPr>
+            <a:spLocks noGrp="1"/>
+          </p:cNvSpPr>
+          <p:nvPr>
+            <p:ph type="dt" sz="half" idx="10"/>
+          </p:nvPr>
+        </p:nvSpPr>
+        <p:spPr/>
+        <p:txBody>
+          <a:bodyPr/>
+          <a:lstStyle/>
+          <a:p>
+            <a:r>
+              <a:rPr lang="en-US"/>
+              <a:t>9/18/2023</a:t>
+            </a:r>
+          </a:p>
+        </p:txBody>
+      </p:sp>
+      <p:sp>
+        <p:nvSpPr>
+          <p:cNvPr id="5" name="Footer Placeholder 4">
+            <a:extLst>
+              <a:ext uri="{FF2B5EF4-FFF2-40B4-BE49-F238E27FC236}">
+                <a16:creationId xmlns:a16="http://schemas.microsoft.com/office/drawing/2014/main" id="{12C3C501-84F7-BF25-4E1D-2279B25D5087}"/>
+              </a:ext>
+            </a:extLst>
+          </p:cNvPr>
+          <p:cNvSpPr>
+            <a:spLocks noGrp="1"/>
+          </p:cNvSpPr>
+          <p:nvPr>
+            <p:ph type="ftr" sz="quarter" idx="11"/>
+          </p:nvPr>
+        </p:nvSpPr>
+        <p:spPr/>
+        <p:txBody>
+          <a:bodyPr/>
+          <a:lstStyle/>
+          <a:p>
+            <a:r>
+              <a:rPr lang="en-US"/>
+              <a:t>Preliminary Design Review</a:t>
+            </a:r>
+          </a:p>
+        </p:txBody>
+      </p:sp>
+      <p:sp>
+        <p:nvSpPr>
+          <p:cNvPr id="6" name="Slide Number Placeholder 5">
+            <a:extLst>
+              <a:ext uri="{FF2B5EF4-FFF2-40B4-BE49-F238E27FC236}">
+                <a16:creationId xmlns:a16="http://schemas.microsoft.com/office/drawing/2014/main" id="{ED0F6C93-F845-778C-25BA-3629FF2C035D}"/>
+              </a:ext>
+            </a:extLst>
+          </p:cNvPr>
+          <p:cNvSpPr>
+            <a:spLocks noGrp="1"/>
+          </p:cNvSpPr>
+          <p:nvPr>
+            <p:ph type="sldNum" sz="quarter" idx="12"/>
+          </p:nvPr>
+        </p:nvSpPr>
+        <p:spPr/>
+        <p:txBody>
+          <a:bodyPr/>
+          <a:lstStyle/>
+          <a:p>
+            <a:fld id="{932DE7C4-7503-4383-A791-176189BE253C}" type="slidenum">
+              <a:rPr lang="en-US" smtClean="0"/>
+              <a:t>1</a:t>
+            </a:fld>
+            <a:endParaRPr lang="en-US" dirty="0"/>
           </a:p>
         </p:txBody>
       </p:sp>
@@ -3394,6 +3869,329 @@
     <p:extLst>
       <p:ext uri="{BB962C8B-B14F-4D97-AF65-F5344CB8AC3E}">
         <p14:creationId xmlns:p14="http://schemas.microsoft.com/office/powerpoint/2010/main" val="4119912462"/>
+      </p:ext>
+    </p:extLst>
+  </p:cSld>
+  <p:clrMapOvr>
+    <a:masterClrMapping/>
+  </p:clrMapOvr>
+</p:sld>
+</file>
+
+<file path=ppt/slides/slide10.xml><?xml version="1.0" encoding="utf-8"?>
+<p:sld xmlns:a="http://schemas.openxmlformats.org/drawingml/2006/main" xmlns:r="http://schemas.openxmlformats.org/officeDocument/2006/relationships" xmlns:p="http://schemas.openxmlformats.org/presentationml/2006/main">
+  <p:cSld>
+    <p:spTree>
+      <p:nvGrpSpPr>
+        <p:cNvPr id="1" name=""/>
+        <p:cNvGrpSpPr/>
+        <p:nvPr/>
+      </p:nvGrpSpPr>
+      <p:grpSpPr>
+        <a:xfrm>
+          <a:off x="0" y="0"/>
+          <a:ext cx="0" cy="0"/>
+          <a:chOff x="0" y="0"/>
+          <a:chExt cx="0" cy="0"/>
+        </a:xfrm>
+      </p:grpSpPr>
+      <p:sp>
+        <p:nvSpPr>
+          <p:cNvPr id="2" name="Title 1">
+            <a:extLst>
+              <a:ext uri="{FF2B5EF4-FFF2-40B4-BE49-F238E27FC236}">
+                <a16:creationId xmlns:a16="http://schemas.microsoft.com/office/drawing/2014/main" id="{B3D623C8-8E1B-3FC4-099A-E31712074F02}"/>
+              </a:ext>
+            </a:extLst>
+          </p:cNvPr>
+          <p:cNvSpPr>
+            <a:spLocks noGrp="1"/>
+          </p:cNvSpPr>
+          <p:nvPr>
+            <p:ph type="title"/>
+          </p:nvPr>
+        </p:nvSpPr>
+        <p:spPr/>
+        <p:txBody>
+          <a:bodyPr/>
+          <a:lstStyle/>
+          <a:p>
+            <a:r>
+              <a:rPr lang="en-US"/>
+              <a:t>Concept Diagram</a:t>
+            </a:r>
+            <a:endParaRPr lang="en-US" dirty="0"/>
+          </a:p>
+        </p:txBody>
+      </p:sp>
+      <p:pic>
+        <p:nvPicPr>
+          <p:cNvPr id="9" name="Content Placeholder 8" descr="A diagram of a computer network&#10;&#10;Description automatically generated">
+            <a:extLst>
+              <a:ext uri="{FF2B5EF4-FFF2-40B4-BE49-F238E27FC236}">
+                <a16:creationId xmlns:a16="http://schemas.microsoft.com/office/drawing/2014/main" id="{52626EE7-D42D-6FA3-C209-35D4A7F5273D}"/>
+              </a:ext>
+            </a:extLst>
+          </p:cNvPr>
+          <p:cNvPicPr>
+            <a:picLocks noGrp="1" noChangeAspect="1"/>
+          </p:cNvPicPr>
+          <p:nvPr>
+            <p:ph idx="4294967295"/>
+          </p:nvPr>
+        </p:nvPicPr>
+        <p:blipFill>
+          <a:blip r:embed="rId2">
+            <a:extLst>
+              <a:ext uri="{28A0092B-C50C-407E-A947-70E740481C1C}">
+                <a14:useLocalDpi xmlns:a14="http://schemas.microsoft.com/office/drawing/2010/main" val="0"/>
+              </a:ext>
+            </a:extLst>
+          </a:blip>
+          <a:stretch>
+            <a:fillRect/>
+          </a:stretch>
+        </p:blipFill>
+        <p:spPr>
+          <a:xfrm>
+            <a:off x="2955925" y="1825625"/>
+            <a:ext cx="6280150" cy="4351338"/>
+          </a:xfrm>
+        </p:spPr>
+      </p:pic>
+      <p:sp>
+        <p:nvSpPr>
+          <p:cNvPr id="11" name="TextBox 10">
+            <a:extLst>
+              <a:ext uri="{FF2B5EF4-FFF2-40B4-BE49-F238E27FC236}">
+                <a16:creationId xmlns:a16="http://schemas.microsoft.com/office/drawing/2014/main" id="{94BFEE93-D2A9-2CA5-3F22-189C06E5D3E4}"/>
+              </a:ext>
+            </a:extLst>
+          </p:cNvPr>
+          <p:cNvSpPr txBox="1"/>
+          <p:nvPr/>
+        </p:nvSpPr>
+        <p:spPr>
+          <a:xfrm>
+            <a:off x="5929313" y="5172076"/>
+            <a:ext cx="1809750" cy="923330"/>
+          </a:xfrm>
+          <a:prstGeom prst="rect">
+            <a:avLst/>
+          </a:prstGeom>
+          <a:noFill/>
+        </p:spPr>
+        <p:txBody>
+          <a:bodyPr wrap="square" rtlCol="0">
+            <a:spAutoFit/>
+          </a:bodyPr>
+          <a:lstStyle/>
+          <a:p>
+            <a:pPr algn="ctr"/>
+            <a:r>
+              <a:rPr lang="en-US" dirty="0"/>
+              <a:t>User will select player when ready to throw</a:t>
+            </a:r>
+          </a:p>
+        </p:txBody>
+      </p:sp>
+      <p:sp>
+        <p:nvSpPr>
+          <p:cNvPr id="13" name="TextBox 12">
+            <a:extLst>
+              <a:ext uri="{FF2B5EF4-FFF2-40B4-BE49-F238E27FC236}">
+                <a16:creationId xmlns:a16="http://schemas.microsoft.com/office/drawing/2014/main" id="{360EC8A1-010F-3433-49CA-1375F604A15F}"/>
+              </a:ext>
+            </a:extLst>
+          </p:cNvPr>
+          <p:cNvSpPr txBox="1"/>
+          <p:nvPr/>
+        </p:nvSpPr>
+        <p:spPr>
+          <a:xfrm>
+            <a:off x="1223962" y="1876426"/>
+            <a:ext cx="2128837" cy="923330"/>
+          </a:xfrm>
+          <a:prstGeom prst="rect">
+            <a:avLst/>
+          </a:prstGeom>
+          <a:noFill/>
+        </p:spPr>
+        <p:txBody>
+          <a:bodyPr wrap="square" rtlCol="0">
+            <a:spAutoFit/>
+          </a:bodyPr>
+          <a:lstStyle/>
+          <a:p>
+            <a:pPr algn="ctr"/>
+            <a:r>
+              <a:rPr lang="en-US" dirty="0"/>
+              <a:t>Jetson will use CV to produce dart position and score</a:t>
+            </a:r>
+          </a:p>
+        </p:txBody>
+      </p:sp>
+      <p:sp>
+        <p:nvSpPr>
+          <p:cNvPr id="14" name="TextBox 13">
+            <a:extLst>
+              <a:ext uri="{FF2B5EF4-FFF2-40B4-BE49-F238E27FC236}">
+                <a16:creationId xmlns:a16="http://schemas.microsoft.com/office/drawing/2014/main" id="{5175ACCA-14E8-6008-4F2F-B7A7EBDE2E2D}"/>
+              </a:ext>
+            </a:extLst>
+          </p:cNvPr>
+          <p:cNvSpPr txBox="1"/>
+          <p:nvPr/>
+        </p:nvSpPr>
+        <p:spPr>
+          <a:xfrm>
+            <a:off x="509588" y="3539629"/>
+            <a:ext cx="2843211" cy="923330"/>
+          </a:xfrm>
+          <a:prstGeom prst="rect">
+            <a:avLst/>
+          </a:prstGeom>
+          <a:noFill/>
+        </p:spPr>
+        <p:txBody>
+          <a:bodyPr wrap="square" rtlCol="0">
+            <a:spAutoFit/>
+          </a:bodyPr>
+          <a:lstStyle/>
+          <a:p>
+            <a:pPr algn="ctr"/>
+            <a:r>
+              <a:rPr lang="en-US" dirty="0"/>
+              <a:t>Pi will receive message from Jetson when position has been identified</a:t>
+            </a:r>
+          </a:p>
+        </p:txBody>
+      </p:sp>
+      <p:sp>
+        <p:nvSpPr>
+          <p:cNvPr id="15" name="TextBox 14">
+            <a:extLst>
+              <a:ext uri="{FF2B5EF4-FFF2-40B4-BE49-F238E27FC236}">
+                <a16:creationId xmlns:a16="http://schemas.microsoft.com/office/drawing/2014/main" id="{7A0F2412-4D8D-AC3E-1892-1E0858F8D269}"/>
+              </a:ext>
+            </a:extLst>
+          </p:cNvPr>
+          <p:cNvSpPr txBox="1"/>
+          <p:nvPr/>
+        </p:nvSpPr>
+        <p:spPr>
+          <a:xfrm>
+            <a:off x="9236497" y="3262630"/>
+            <a:ext cx="1809750" cy="1477328"/>
+          </a:xfrm>
+          <a:prstGeom prst="rect">
+            <a:avLst/>
+          </a:prstGeom>
+          <a:noFill/>
+        </p:spPr>
+        <p:txBody>
+          <a:bodyPr wrap="square" rtlCol="0">
+            <a:spAutoFit/>
+          </a:bodyPr>
+          <a:lstStyle/>
+          <a:p>
+            <a:pPr algn="ctr"/>
+            <a:r>
+              <a:rPr lang="en-US" dirty="0"/>
+              <a:t>User can use mobile app to view statistics and current score</a:t>
+            </a:r>
+          </a:p>
+        </p:txBody>
+      </p:sp>
+      <p:sp>
+        <p:nvSpPr>
+          <p:cNvPr id="3" name="Date Placeholder 2">
+            <a:extLst>
+              <a:ext uri="{FF2B5EF4-FFF2-40B4-BE49-F238E27FC236}">
+                <a16:creationId xmlns:a16="http://schemas.microsoft.com/office/drawing/2014/main" id="{98CCF00A-A3E7-9E7F-250F-3C287FDBEBD1}"/>
+              </a:ext>
+            </a:extLst>
+          </p:cNvPr>
+          <p:cNvSpPr>
+            <a:spLocks noGrp="1"/>
+          </p:cNvSpPr>
+          <p:nvPr>
+            <p:ph type="dt" sz="half" idx="10"/>
+          </p:nvPr>
+        </p:nvSpPr>
+        <p:spPr/>
+        <p:txBody>
+          <a:bodyPr/>
+          <a:lstStyle/>
+          <a:p>
+            <a:r>
+              <a:rPr lang="en-US"/>
+              <a:t>9/18/2023</a:t>
+            </a:r>
+          </a:p>
+        </p:txBody>
+      </p:sp>
+      <p:sp>
+        <p:nvSpPr>
+          <p:cNvPr id="4" name="Footer Placeholder 3">
+            <a:extLst>
+              <a:ext uri="{FF2B5EF4-FFF2-40B4-BE49-F238E27FC236}">
+                <a16:creationId xmlns:a16="http://schemas.microsoft.com/office/drawing/2014/main" id="{005A3916-6EB4-CBD8-4E60-9E154A69CE3E}"/>
+              </a:ext>
+            </a:extLst>
+          </p:cNvPr>
+          <p:cNvSpPr>
+            <a:spLocks noGrp="1"/>
+          </p:cNvSpPr>
+          <p:nvPr>
+            <p:ph type="ftr" sz="quarter" idx="11"/>
+          </p:nvPr>
+        </p:nvSpPr>
+        <p:spPr/>
+        <p:txBody>
+          <a:bodyPr/>
+          <a:lstStyle/>
+          <a:p>
+            <a:r>
+              <a:rPr lang="en-US"/>
+              <a:t>Preliminary Design Review</a:t>
+            </a:r>
+          </a:p>
+        </p:txBody>
+      </p:sp>
+      <p:sp>
+        <p:nvSpPr>
+          <p:cNvPr id="5" name="Slide Number Placeholder 4">
+            <a:extLst>
+              <a:ext uri="{FF2B5EF4-FFF2-40B4-BE49-F238E27FC236}">
+                <a16:creationId xmlns:a16="http://schemas.microsoft.com/office/drawing/2014/main" id="{58B674DA-7717-041F-325E-83CAD1FDF084}"/>
+              </a:ext>
+            </a:extLst>
+          </p:cNvPr>
+          <p:cNvSpPr>
+            <a:spLocks noGrp="1"/>
+          </p:cNvSpPr>
+          <p:nvPr>
+            <p:ph type="sldNum" sz="quarter" idx="12"/>
+          </p:nvPr>
+        </p:nvSpPr>
+        <p:spPr/>
+        <p:txBody>
+          <a:bodyPr/>
+          <a:lstStyle/>
+          <a:p>
+            <a:fld id="{932DE7C4-7503-4383-A791-176189BE253C}" type="slidenum">
+              <a:rPr lang="en-US" smtClean="0"/>
+              <a:t>10</a:t>
+            </a:fld>
+            <a:endParaRPr lang="en-US"/>
+          </a:p>
+        </p:txBody>
+      </p:sp>
+    </p:spTree>
+    <p:extLst>
+      <p:ext uri="{BB962C8B-B14F-4D97-AF65-F5344CB8AC3E}">
+        <p14:creationId xmlns:p14="http://schemas.microsoft.com/office/powerpoint/2010/main" val="2620406225"/>
       </p:ext>
     </p:extLst>
   </p:cSld>
@@ -3499,6 +4297,97 @@
               <a:rPr lang="en-US" dirty="0"/>
               <a:t>State Machines</a:t>
             </a:r>
+          </a:p>
+          <a:p>
+            <a:r>
+              <a:rPr lang="en-US" dirty="0"/>
+              <a:t>Interface Description</a:t>
+            </a:r>
+          </a:p>
+        </p:txBody>
+      </p:sp>
+      <p:sp>
+        <p:nvSpPr>
+          <p:cNvPr id="4" name="Date Placeholder 3">
+            <a:extLst>
+              <a:ext uri="{FF2B5EF4-FFF2-40B4-BE49-F238E27FC236}">
+                <a16:creationId xmlns:a16="http://schemas.microsoft.com/office/drawing/2014/main" id="{A03D5796-D658-75F6-EABF-A91B3E80E6A1}"/>
+              </a:ext>
+            </a:extLst>
+          </p:cNvPr>
+          <p:cNvSpPr>
+            <a:spLocks noGrp="1"/>
+          </p:cNvSpPr>
+          <p:nvPr>
+            <p:ph type="dt" sz="half" idx="10"/>
+          </p:nvPr>
+        </p:nvSpPr>
+        <p:spPr/>
+        <p:txBody>
+          <a:bodyPr/>
+          <a:lstStyle/>
+          <a:p>
+            <a:r>
+              <a:rPr lang="en-US"/>
+              <a:t>9/18/2023</a:t>
+            </a:r>
+          </a:p>
+        </p:txBody>
+      </p:sp>
+      <p:sp>
+        <p:nvSpPr>
+          <p:cNvPr id="5" name="Footer Placeholder 4">
+            <a:extLst>
+              <a:ext uri="{FF2B5EF4-FFF2-40B4-BE49-F238E27FC236}">
+                <a16:creationId xmlns:a16="http://schemas.microsoft.com/office/drawing/2014/main" id="{6B414D59-B05C-0B2C-5635-2E678AC4B9BB}"/>
+              </a:ext>
+            </a:extLst>
+          </p:cNvPr>
+          <p:cNvSpPr>
+            <a:spLocks noGrp="1"/>
+          </p:cNvSpPr>
+          <p:nvPr>
+            <p:ph type="ftr" sz="quarter" idx="11"/>
+          </p:nvPr>
+        </p:nvSpPr>
+        <p:spPr/>
+        <p:txBody>
+          <a:bodyPr/>
+          <a:lstStyle/>
+          <a:p>
+            <a:r>
+              <a:rPr lang="en-US"/>
+              <a:t>Preliminary Design Review</a:t>
+            </a:r>
+          </a:p>
+        </p:txBody>
+      </p:sp>
+      <p:sp>
+        <p:nvSpPr>
+          <p:cNvPr id="6" name="Slide Number Placeholder 5">
+            <a:extLst>
+              <a:ext uri="{FF2B5EF4-FFF2-40B4-BE49-F238E27FC236}">
+                <a16:creationId xmlns:a16="http://schemas.microsoft.com/office/drawing/2014/main" id="{1323EA3E-050E-67BF-7736-5A71027CF6EF}"/>
+              </a:ext>
+            </a:extLst>
+          </p:cNvPr>
+          <p:cNvSpPr>
+            <a:spLocks noGrp="1"/>
+          </p:cNvSpPr>
+          <p:nvPr>
+            <p:ph type="sldNum" sz="quarter" idx="12"/>
+          </p:nvPr>
+        </p:nvSpPr>
+        <p:spPr/>
+        <p:txBody>
+          <a:bodyPr/>
+          <a:lstStyle/>
+          <a:p>
+            <a:fld id="{932DE7C4-7503-4383-A791-176189BE253C}" type="slidenum">
+              <a:rPr lang="en-US" smtClean="0"/>
+              <a:t>2</a:t>
+            </a:fld>
+            <a:endParaRPr lang="en-US"/>
           </a:p>
         </p:txBody>
       </p:sp>
@@ -3660,6 +4549,91 @@
           </a:p>
         </p:txBody>
       </p:sp>
+      <p:sp>
+        <p:nvSpPr>
+          <p:cNvPr id="4" name="Date Placeholder 3">
+            <a:extLst>
+              <a:ext uri="{FF2B5EF4-FFF2-40B4-BE49-F238E27FC236}">
+                <a16:creationId xmlns:a16="http://schemas.microsoft.com/office/drawing/2014/main" id="{ED5AD918-5FDB-8B35-E5C9-D63119FB6763}"/>
+              </a:ext>
+            </a:extLst>
+          </p:cNvPr>
+          <p:cNvSpPr>
+            <a:spLocks noGrp="1"/>
+          </p:cNvSpPr>
+          <p:nvPr>
+            <p:ph type="dt" sz="half" idx="10"/>
+          </p:nvPr>
+        </p:nvSpPr>
+        <p:spPr/>
+        <p:txBody>
+          <a:bodyPr/>
+          <a:lstStyle/>
+          <a:p>
+            <a:r>
+              <a:rPr lang="en-US"/>
+              <a:t>9/18/2023</a:t>
+            </a:r>
+          </a:p>
+        </p:txBody>
+      </p:sp>
+      <p:sp>
+        <p:nvSpPr>
+          <p:cNvPr id="5" name="Footer Placeholder 4">
+            <a:extLst>
+              <a:ext uri="{FF2B5EF4-FFF2-40B4-BE49-F238E27FC236}">
+                <a16:creationId xmlns:a16="http://schemas.microsoft.com/office/drawing/2014/main" id="{3E5F71DA-3321-8F5D-D58F-20EDB3BD2BD7}"/>
+              </a:ext>
+            </a:extLst>
+          </p:cNvPr>
+          <p:cNvSpPr>
+            <a:spLocks noGrp="1"/>
+          </p:cNvSpPr>
+          <p:nvPr>
+            <p:ph type="ftr" sz="quarter" idx="11"/>
+          </p:nvPr>
+        </p:nvSpPr>
+        <p:spPr/>
+        <p:txBody>
+          <a:bodyPr/>
+          <a:lstStyle/>
+          <a:p>
+            <a:r>
+              <a:rPr lang="en-US"/>
+              <a:t>Preliminary Design Review</a:t>
+            </a:r>
+          </a:p>
+        </p:txBody>
+      </p:sp>
+      <p:sp>
+        <p:nvSpPr>
+          <p:cNvPr id="6" name="Slide Number Placeholder 5">
+            <a:extLst>
+              <a:ext uri="{FF2B5EF4-FFF2-40B4-BE49-F238E27FC236}">
+                <a16:creationId xmlns:a16="http://schemas.microsoft.com/office/drawing/2014/main" id="{0636A339-2BD3-DC4C-25D9-06E9C65FB68E}"/>
+              </a:ext>
+            </a:extLst>
+          </p:cNvPr>
+          <p:cNvSpPr>
+            <a:spLocks noGrp="1"/>
+          </p:cNvSpPr>
+          <p:nvPr>
+            <p:ph type="sldNum" sz="quarter" idx="12"/>
+          </p:nvPr>
+        </p:nvSpPr>
+        <p:spPr/>
+        <p:txBody>
+          <a:bodyPr/>
+          <a:lstStyle/>
+          <a:p>
+            <a:fld id="{932DE7C4-7503-4383-A791-176189BE253C}" type="slidenum">
+              <a:rPr lang="en-US" smtClean="0"/>
+              <a:t>3</a:t>
+            </a:fld>
+            <a:endParaRPr lang="en-US"/>
+          </a:p>
+        </p:txBody>
+      </p:sp>
     </p:spTree>
     <p:extLst>
       <p:ext uri="{BB962C8B-B14F-4D97-AF65-F5344CB8AC3E}">
@@ -3832,6 +4806,91 @@
           </a:p>
         </p:txBody>
       </p:sp>
+      <p:sp>
+        <p:nvSpPr>
+          <p:cNvPr id="3" name="Date Placeholder 2">
+            <a:extLst>
+              <a:ext uri="{FF2B5EF4-FFF2-40B4-BE49-F238E27FC236}">
+                <a16:creationId xmlns:a16="http://schemas.microsoft.com/office/drawing/2014/main" id="{38ADAFBE-A9CC-C268-E2FD-1B48258E0D9B}"/>
+              </a:ext>
+            </a:extLst>
+          </p:cNvPr>
+          <p:cNvSpPr>
+            <a:spLocks noGrp="1"/>
+          </p:cNvSpPr>
+          <p:nvPr>
+            <p:ph type="dt" sz="half" idx="10"/>
+          </p:nvPr>
+        </p:nvSpPr>
+        <p:spPr/>
+        <p:txBody>
+          <a:bodyPr/>
+          <a:lstStyle/>
+          <a:p>
+            <a:r>
+              <a:rPr lang="en-US"/>
+              <a:t>9/18/2023</a:t>
+            </a:r>
+          </a:p>
+        </p:txBody>
+      </p:sp>
+      <p:sp>
+        <p:nvSpPr>
+          <p:cNvPr id="4" name="Footer Placeholder 3">
+            <a:extLst>
+              <a:ext uri="{FF2B5EF4-FFF2-40B4-BE49-F238E27FC236}">
+                <a16:creationId xmlns:a16="http://schemas.microsoft.com/office/drawing/2014/main" id="{36DF066D-E47E-E175-8C8C-00E373E5BB57}"/>
+              </a:ext>
+            </a:extLst>
+          </p:cNvPr>
+          <p:cNvSpPr>
+            <a:spLocks noGrp="1"/>
+          </p:cNvSpPr>
+          <p:nvPr>
+            <p:ph type="ftr" sz="quarter" idx="11"/>
+          </p:nvPr>
+        </p:nvSpPr>
+        <p:spPr/>
+        <p:txBody>
+          <a:bodyPr/>
+          <a:lstStyle/>
+          <a:p>
+            <a:r>
+              <a:rPr lang="en-US"/>
+              <a:t>Preliminary Design Review</a:t>
+            </a:r>
+          </a:p>
+        </p:txBody>
+      </p:sp>
+      <p:sp>
+        <p:nvSpPr>
+          <p:cNvPr id="6" name="Slide Number Placeholder 5">
+            <a:extLst>
+              <a:ext uri="{FF2B5EF4-FFF2-40B4-BE49-F238E27FC236}">
+                <a16:creationId xmlns:a16="http://schemas.microsoft.com/office/drawing/2014/main" id="{A43521BB-5DEA-5970-8DA1-DF46A11C2A00}"/>
+              </a:ext>
+            </a:extLst>
+          </p:cNvPr>
+          <p:cNvSpPr>
+            <a:spLocks noGrp="1"/>
+          </p:cNvSpPr>
+          <p:nvPr>
+            <p:ph type="sldNum" sz="quarter" idx="12"/>
+          </p:nvPr>
+        </p:nvSpPr>
+        <p:spPr/>
+        <p:txBody>
+          <a:bodyPr/>
+          <a:lstStyle/>
+          <a:p>
+            <a:fld id="{932DE7C4-7503-4383-A791-176189BE253C}" type="slidenum">
+              <a:rPr lang="en-US" smtClean="0"/>
+              <a:t>4</a:t>
+            </a:fld>
+            <a:endParaRPr lang="en-US"/>
+          </a:p>
+        </p:txBody>
+      </p:sp>
     </p:spTree>
     <p:extLst>
       <p:ext uri="{BB962C8B-B14F-4D97-AF65-F5344CB8AC3E}">
@@ -3958,6 +5017,91 @@
           </a:p>
         </p:txBody>
       </p:sp>
+      <p:sp>
+        <p:nvSpPr>
+          <p:cNvPr id="2" name="Date Placeholder 1">
+            <a:extLst>
+              <a:ext uri="{FF2B5EF4-FFF2-40B4-BE49-F238E27FC236}">
+                <a16:creationId xmlns:a16="http://schemas.microsoft.com/office/drawing/2014/main" id="{83734269-AD52-0E04-E0CC-7DE9CD2BB0A9}"/>
+              </a:ext>
+            </a:extLst>
+          </p:cNvPr>
+          <p:cNvSpPr>
+            <a:spLocks noGrp="1"/>
+          </p:cNvSpPr>
+          <p:nvPr>
+            <p:ph type="dt" sz="half" idx="10"/>
+          </p:nvPr>
+        </p:nvSpPr>
+        <p:spPr/>
+        <p:txBody>
+          <a:bodyPr/>
+          <a:lstStyle/>
+          <a:p>
+            <a:r>
+              <a:rPr lang="en-US"/>
+              <a:t>9/18/2023</a:t>
+            </a:r>
+          </a:p>
+        </p:txBody>
+      </p:sp>
+      <p:sp>
+        <p:nvSpPr>
+          <p:cNvPr id="3" name="Footer Placeholder 2">
+            <a:extLst>
+              <a:ext uri="{FF2B5EF4-FFF2-40B4-BE49-F238E27FC236}">
+                <a16:creationId xmlns:a16="http://schemas.microsoft.com/office/drawing/2014/main" id="{1D50E741-4C05-8AC8-123F-9F5A7B7E8DDC}"/>
+              </a:ext>
+            </a:extLst>
+          </p:cNvPr>
+          <p:cNvSpPr>
+            <a:spLocks noGrp="1"/>
+          </p:cNvSpPr>
+          <p:nvPr>
+            <p:ph type="ftr" sz="quarter" idx="11"/>
+          </p:nvPr>
+        </p:nvSpPr>
+        <p:spPr/>
+        <p:txBody>
+          <a:bodyPr/>
+          <a:lstStyle/>
+          <a:p>
+            <a:r>
+              <a:rPr lang="en-US"/>
+              <a:t>Preliminary Design Review</a:t>
+            </a:r>
+          </a:p>
+        </p:txBody>
+      </p:sp>
+      <p:sp>
+        <p:nvSpPr>
+          <p:cNvPr id="4" name="Slide Number Placeholder 3">
+            <a:extLst>
+              <a:ext uri="{FF2B5EF4-FFF2-40B4-BE49-F238E27FC236}">
+                <a16:creationId xmlns:a16="http://schemas.microsoft.com/office/drawing/2014/main" id="{06FED665-E444-DFD4-FF90-AAE124200955}"/>
+              </a:ext>
+            </a:extLst>
+          </p:cNvPr>
+          <p:cNvSpPr>
+            <a:spLocks noGrp="1"/>
+          </p:cNvSpPr>
+          <p:nvPr>
+            <p:ph type="sldNum" sz="quarter" idx="12"/>
+          </p:nvPr>
+        </p:nvSpPr>
+        <p:spPr/>
+        <p:txBody>
+          <a:bodyPr/>
+          <a:lstStyle/>
+          <a:p>
+            <a:fld id="{932DE7C4-7503-4383-A791-176189BE253C}" type="slidenum">
+              <a:rPr lang="en-US" smtClean="0"/>
+              <a:t>5</a:t>
+            </a:fld>
+            <a:endParaRPr lang="en-US"/>
+          </a:p>
+        </p:txBody>
+      </p:sp>
     </p:spTree>
     <p:extLst>
       <p:ext uri="{BB962C8B-B14F-4D97-AF65-F5344CB8AC3E}">
@@ -4044,7 +5188,7 @@
         </p:blipFill>
         <p:spPr>
           <a:xfrm>
-            <a:off x="0" y="1534196"/>
+            <a:off x="0" y="1630183"/>
             <a:ext cx="12192000" cy="5323804"/>
           </a:xfrm>
           <a:prstGeom prst="rect">
@@ -4052,6 +5196,35 @@
           </a:prstGeom>
         </p:spPr>
       </p:pic>
+      <p:sp>
+        <p:nvSpPr>
+          <p:cNvPr id="6" name="Slide Number Placeholder 5">
+            <a:extLst>
+              <a:ext uri="{FF2B5EF4-FFF2-40B4-BE49-F238E27FC236}">
+                <a16:creationId xmlns:a16="http://schemas.microsoft.com/office/drawing/2014/main" id="{3F0FF303-8DFB-955F-CEAC-580331BBBA77}"/>
+              </a:ext>
+            </a:extLst>
+          </p:cNvPr>
+          <p:cNvSpPr>
+            <a:spLocks noGrp="1"/>
+          </p:cNvSpPr>
+          <p:nvPr>
+            <p:ph type="sldNum" sz="quarter" idx="12"/>
+          </p:nvPr>
+        </p:nvSpPr>
+        <p:spPr/>
+        <p:txBody>
+          <a:bodyPr/>
+          <a:lstStyle/>
+          <a:p>
+            <a:fld id="{932DE7C4-7503-4383-A791-176189BE253C}" type="slidenum">
+              <a:rPr lang="en-US" smtClean="0"/>
+              <a:t>6</a:t>
+            </a:fld>
+            <a:endParaRPr lang="en-US"/>
+          </a:p>
+        </p:txBody>
+      </p:sp>
     </p:spTree>
     <p:extLst>
       <p:ext uri="{BB962C8B-B14F-4D97-AF65-F5344CB8AC3E}">
@@ -4265,6 +5438,35 @@
           </a:p>
         </p:txBody>
       </p:sp>
+      <p:sp>
+        <p:nvSpPr>
+          <p:cNvPr id="9" name="Slide Number Placeholder 8">
+            <a:extLst>
+              <a:ext uri="{FF2B5EF4-FFF2-40B4-BE49-F238E27FC236}">
+                <a16:creationId xmlns:a16="http://schemas.microsoft.com/office/drawing/2014/main" id="{CCB5DCD5-4183-0B6C-2781-E720849DC9AD}"/>
+              </a:ext>
+            </a:extLst>
+          </p:cNvPr>
+          <p:cNvSpPr>
+            <a:spLocks noGrp="1"/>
+          </p:cNvSpPr>
+          <p:nvPr>
+            <p:ph type="sldNum" sz="quarter" idx="12"/>
+          </p:nvPr>
+        </p:nvSpPr>
+        <p:spPr/>
+        <p:txBody>
+          <a:bodyPr/>
+          <a:lstStyle/>
+          <a:p>
+            <a:fld id="{932DE7C4-7503-4383-A791-176189BE253C}" type="slidenum">
+              <a:rPr lang="en-US" smtClean="0"/>
+              <a:t>7</a:t>
+            </a:fld>
+            <a:endParaRPr lang="en-US"/>
+          </a:p>
+        </p:txBody>
+      </p:sp>
     </p:spTree>
     <p:extLst>
       <p:ext uri="{BB962C8B-B14F-4D97-AF65-F5344CB8AC3E}">
@@ -4297,10 +5499,10 @@
       </p:grpSpPr>
       <p:sp>
         <p:nvSpPr>
-          <p:cNvPr id="3" name="Title 2">
-            <a:extLst>
-              <a:ext uri="{FF2B5EF4-FFF2-40B4-BE49-F238E27FC236}">
-                <a16:creationId xmlns:a16="http://schemas.microsoft.com/office/drawing/2014/main" id="{1F208E80-636B-BFE8-2DD4-2949F302529A}"/>
+          <p:cNvPr id="2" name="Title 1">
+            <a:extLst>
+              <a:ext uri="{FF2B5EF4-FFF2-40B4-BE49-F238E27FC236}">
+                <a16:creationId xmlns:a16="http://schemas.microsoft.com/office/drawing/2014/main" id="{95EAFA5B-56EF-6F3F-A389-13CC87719B4C}"/>
               </a:ext>
             </a:extLst>
           </p:cNvPr>
@@ -4311,30 +5513,143 @@
             <p:ph type="title"/>
           </p:nvPr>
         </p:nvSpPr>
+        <p:spPr/>
+        <p:txBody>
+          <a:bodyPr/>
+          <a:lstStyle/>
+          <a:p>
+            <a:r>
+              <a:rPr lang="en-US" dirty="0"/>
+              <a:t>Interface Description</a:t>
+            </a:r>
+          </a:p>
+        </p:txBody>
+      </p:sp>
+      <p:sp>
+        <p:nvSpPr>
+          <p:cNvPr id="4" name="Date Placeholder 3">
+            <a:extLst>
+              <a:ext uri="{FF2B5EF4-FFF2-40B4-BE49-F238E27FC236}">
+                <a16:creationId xmlns:a16="http://schemas.microsoft.com/office/drawing/2014/main" id="{1416074C-A96D-6955-1101-48016AC1F27F}"/>
+              </a:ext>
+            </a:extLst>
+          </p:cNvPr>
+          <p:cNvSpPr>
+            <a:spLocks noGrp="1"/>
+          </p:cNvSpPr>
+          <p:nvPr>
+            <p:ph type="dt" sz="half" idx="10"/>
+          </p:nvPr>
+        </p:nvSpPr>
+        <p:spPr/>
+        <p:txBody>
+          <a:bodyPr/>
+          <a:lstStyle/>
+          <a:p>
+            <a:r>
+              <a:rPr lang="en-US"/>
+              <a:t>9/18/2023</a:t>
+            </a:r>
+          </a:p>
+        </p:txBody>
+      </p:sp>
+      <p:sp>
+        <p:nvSpPr>
+          <p:cNvPr id="5" name="Footer Placeholder 4">
+            <a:extLst>
+              <a:ext uri="{FF2B5EF4-FFF2-40B4-BE49-F238E27FC236}">
+                <a16:creationId xmlns:a16="http://schemas.microsoft.com/office/drawing/2014/main" id="{46F2E8E3-69E1-4F6D-BB83-5D0111D60671}"/>
+              </a:ext>
+            </a:extLst>
+          </p:cNvPr>
+          <p:cNvSpPr>
+            <a:spLocks noGrp="1"/>
+          </p:cNvSpPr>
+          <p:nvPr>
+            <p:ph type="ftr" sz="quarter" idx="11"/>
+          </p:nvPr>
+        </p:nvSpPr>
+        <p:spPr/>
+        <p:txBody>
+          <a:bodyPr/>
+          <a:lstStyle/>
+          <a:p>
+            <a:r>
+              <a:rPr lang="en-US"/>
+              <a:t>Preliminary Design Review</a:t>
+            </a:r>
+          </a:p>
+        </p:txBody>
+      </p:sp>
+      <p:sp>
+        <p:nvSpPr>
+          <p:cNvPr id="6" name="Slide Number Placeholder 5">
+            <a:extLst>
+              <a:ext uri="{FF2B5EF4-FFF2-40B4-BE49-F238E27FC236}">
+                <a16:creationId xmlns:a16="http://schemas.microsoft.com/office/drawing/2014/main" id="{483A3D2A-D437-9FEF-2B27-D5E71343CE96}"/>
+              </a:ext>
+            </a:extLst>
+          </p:cNvPr>
+          <p:cNvSpPr>
+            <a:spLocks noGrp="1"/>
+          </p:cNvSpPr>
+          <p:nvPr>
+            <p:ph type="sldNum" sz="quarter" idx="12"/>
+          </p:nvPr>
+        </p:nvSpPr>
+        <p:spPr/>
+        <p:txBody>
+          <a:bodyPr/>
+          <a:lstStyle/>
+          <a:p>
+            <a:fld id="{932DE7C4-7503-4383-A791-176189BE253C}" type="slidenum">
+              <a:rPr lang="en-US" smtClean="0"/>
+              <a:t>8</a:t>
+            </a:fld>
+            <a:endParaRPr lang="en-US"/>
+          </a:p>
+        </p:txBody>
+      </p:sp>
+      <p:pic>
+        <p:nvPicPr>
+          <p:cNvPr id="8" name="Picture 7" descr="A diagram of a computer network">
+            <a:extLst>
+              <a:ext uri="{FF2B5EF4-FFF2-40B4-BE49-F238E27FC236}">
+                <a16:creationId xmlns:a16="http://schemas.microsoft.com/office/drawing/2014/main" id="{6D2A3285-43FF-63E5-D514-194B00E01324}"/>
+              </a:ext>
+            </a:extLst>
+          </p:cNvPr>
+          <p:cNvPicPr>
+            <a:picLocks noChangeAspect="1"/>
+          </p:cNvPicPr>
+          <p:nvPr/>
+        </p:nvPicPr>
+        <p:blipFill>
+          <a:blip r:embed="rId2">
+            <a:extLst>
+              <a:ext uri="{28A0092B-C50C-407E-A947-70E740481C1C}">
+                <a14:useLocalDpi xmlns:a14="http://schemas.microsoft.com/office/drawing/2010/main" val="0"/>
+              </a:ext>
+            </a:extLst>
+          </a:blip>
+          <a:stretch>
+            <a:fillRect/>
+          </a:stretch>
+        </p:blipFill>
         <p:spPr>
           <a:xfrm>
-            <a:off x="838200" y="2766218"/>
-            <a:ext cx="10515600" cy="1325563"/>
+            <a:off x="1138237" y="2080419"/>
+            <a:ext cx="9915525" cy="3886200"/>
           </a:xfrm>
+          <a:prstGeom prst="rect">
+            <a:avLst/>
+          </a:prstGeom>
         </p:spPr>
-        <p:txBody>
-          <a:bodyPr>
-            <a:normAutofit/>
-          </a:bodyPr>
-          <a:lstStyle/>
-          <a:p>
-            <a:pPr algn="ctr"/>
-            <a:r>
-              <a:rPr lang="en-US" sz="6000" dirty="0"/>
-              <a:t>Backup</a:t>
-            </a:r>
-          </a:p>
-        </p:txBody>
-      </p:sp>
+      </p:pic>
     </p:spTree>
     <p:extLst>
       <p:ext uri="{BB962C8B-B14F-4D97-AF65-F5344CB8AC3E}">
-        <p14:creationId xmlns:p14="http://schemas.microsoft.com/office/powerpoint/2010/main" val="46388902"/>
+        <p14:creationId xmlns:p14="http://schemas.microsoft.com/office/powerpoint/2010/main" val="2648932335"/>
       </p:ext>
     </p:extLst>
   </p:cSld>
@@ -4363,10 +5678,10 @@
       </p:grpSpPr>
       <p:sp>
         <p:nvSpPr>
-          <p:cNvPr id="2" name="Title 1">
-            <a:extLst>
-              <a:ext uri="{FF2B5EF4-FFF2-40B4-BE49-F238E27FC236}">
-                <a16:creationId xmlns:a16="http://schemas.microsoft.com/office/drawing/2014/main" id="{B3D623C8-8E1B-3FC4-099A-E31712074F02}"/>
+          <p:cNvPr id="3" name="Title 2">
+            <a:extLst>
+              <a:ext uri="{FF2B5EF4-FFF2-40B4-BE49-F238E27FC236}">
+                <a16:creationId xmlns:a16="http://schemas.microsoft.com/office/drawing/2014/main" id="{1F208E80-636B-BFE8-2DD4-2949F302529A}"/>
               </a:ext>
             </a:extLst>
           </p:cNvPr>
@@ -4377,202 +5692,115 @@
             <p:ph type="title"/>
           </p:nvPr>
         </p:nvSpPr>
-        <p:spPr/>
-        <p:txBody>
-          <a:bodyPr/>
-          <a:lstStyle/>
-          <a:p>
-            <a:r>
-              <a:rPr lang="en-US"/>
-              <a:t>Concept Diagram</a:t>
-            </a:r>
-            <a:endParaRPr lang="en-US" dirty="0"/>
-          </a:p>
-        </p:txBody>
-      </p:sp>
-      <p:pic>
-        <p:nvPicPr>
-          <p:cNvPr id="9" name="Content Placeholder 8" descr="A diagram of a computer network&#10;&#10;Description automatically generated">
-            <a:extLst>
-              <a:ext uri="{FF2B5EF4-FFF2-40B4-BE49-F238E27FC236}">
-                <a16:creationId xmlns:a16="http://schemas.microsoft.com/office/drawing/2014/main" id="{52626EE7-D42D-6FA3-C209-35D4A7F5273D}"/>
-              </a:ext>
-            </a:extLst>
-          </p:cNvPr>
-          <p:cNvPicPr>
-            <a:picLocks noGrp="1" noChangeAspect="1"/>
-          </p:cNvPicPr>
-          <p:nvPr>
-            <p:ph idx="4294967295"/>
-          </p:nvPr>
-        </p:nvPicPr>
-        <p:blipFill>
-          <a:blip r:embed="rId2">
-            <a:extLst>
-              <a:ext uri="{28A0092B-C50C-407E-A947-70E740481C1C}">
-                <a14:useLocalDpi xmlns:a14="http://schemas.microsoft.com/office/drawing/2010/main" val="0"/>
-              </a:ext>
-            </a:extLst>
-          </a:blip>
-          <a:stretch>
-            <a:fillRect/>
-          </a:stretch>
-        </p:blipFill>
         <p:spPr>
           <a:xfrm>
-            <a:off x="2955925" y="1825625"/>
-            <a:ext cx="6280150" cy="4351338"/>
+            <a:off x="838200" y="2766218"/>
+            <a:ext cx="10515600" cy="1325563"/>
           </a:xfrm>
         </p:spPr>
-      </p:pic>
-      <p:sp>
-        <p:nvSpPr>
-          <p:cNvPr id="11" name="TextBox 10">
-            <a:extLst>
-              <a:ext uri="{FF2B5EF4-FFF2-40B4-BE49-F238E27FC236}">
-                <a16:creationId xmlns:a16="http://schemas.microsoft.com/office/drawing/2014/main" id="{94BFEE93-D2A9-2CA5-3F22-189C06E5D3E4}"/>
-              </a:ext>
-            </a:extLst>
-          </p:cNvPr>
-          <p:cNvSpPr txBox="1"/>
-          <p:nvPr/>
-        </p:nvSpPr>
-        <p:spPr>
-          <a:xfrm>
-            <a:off x="5929313" y="5172076"/>
-            <a:ext cx="1809750" cy="923330"/>
-          </a:xfrm>
-          <a:prstGeom prst="rect">
-            <a:avLst/>
-          </a:prstGeom>
-          <a:noFill/>
-        </p:spPr>
-        <p:txBody>
-          <a:bodyPr wrap="square" rtlCol="0">
-            <a:spAutoFit/>
+        <p:txBody>
+          <a:bodyPr>
+            <a:normAutofit/>
           </a:bodyPr>
           <a:lstStyle/>
           <a:p>
             <a:pPr algn="ctr"/>
             <a:r>
-              <a:rPr lang="en-US" dirty="0"/>
-              <a:t>User will select player when ready to throw</a:t>
-            </a:r>
-          </a:p>
-        </p:txBody>
-      </p:sp>
-      <p:sp>
-        <p:nvSpPr>
-          <p:cNvPr id="13" name="TextBox 12">
-            <a:extLst>
-              <a:ext uri="{FF2B5EF4-FFF2-40B4-BE49-F238E27FC236}">
-                <a16:creationId xmlns:a16="http://schemas.microsoft.com/office/drawing/2014/main" id="{360EC8A1-010F-3433-49CA-1375F604A15F}"/>
-              </a:ext>
-            </a:extLst>
-          </p:cNvPr>
-          <p:cNvSpPr txBox="1"/>
-          <p:nvPr/>
-        </p:nvSpPr>
-        <p:spPr>
-          <a:xfrm>
-            <a:off x="1223962" y="1876426"/>
-            <a:ext cx="2128837" cy="923330"/>
-          </a:xfrm>
-          <a:prstGeom prst="rect">
-            <a:avLst/>
-          </a:prstGeom>
-          <a:noFill/>
-        </p:spPr>
-        <p:txBody>
-          <a:bodyPr wrap="square" rtlCol="0">
-            <a:spAutoFit/>
-          </a:bodyPr>
-          <a:lstStyle/>
-          <a:p>
-            <a:pPr algn="ctr"/>
-            <a:r>
-              <a:rPr lang="en-US" dirty="0"/>
-              <a:t>Jetson will use CV to produce dart position and score</a:t>
-            </a:r>
-          </a:p>
-        </p:txBody>
-      </p:sp>
-      <p:sp>
-        <p:nvSpPr>
-          <p:cNvPr id="14" name="TextBox 13">
-            <a:extLst>
-              <a:ext uri="{FF2B5EF4-FFF2-40B4-BE49-F238E27FC236}">
-                <a16:creationId xmlns:a16="http://schemas.microsoft.com/office/drawing/2014/main" id="{5175ACCA-14E8-6008-4F2F-B7A7EBDE2E2D}"/>
-              </a:ext>
-            </a:extLst>
-          </p:cNvPr>
-          <p:cNvSpPr txBox="1"/>
-          <p:nvPr/>
-        </p:nvSpPr>
-        <p:spPr>
-          <a:xfrm>
-            <a:off x="509588" y="3539629"/>
-            <a:ext cx="2843211" cy="923330"/>
-          </a:xfrm>
-          <a:prstGeom prst="rect">
-            <a:avLst/>
-          </a:prstGeom>
-          <a:noFill/>
-        </p:spPr>
-        <p:txBody>
-          <a:bodyPr wrap="square" rtlCol="0">
-            <a:spAutoFit/>
-          </a:bodyPr>
-          <a:lstStyle/>
-          <a:p>
-            <a:pPr algn="ctr"/>
-            <a:r>
-              <a:rPr lang="en-US" dirty="0"/>
-              <a:t>Pi will receive message from Jetson when position has been identified</a:t>
-            </a:r>
-          </a:p>
-        </p:txBody>
-      </p:sp>
-      <p:sp>
-        <p:nvSpPr>
-          <p:cNvPr id="15" name="TextBox 14">
-            <a:extLst>
-              <a:ext uri="{FF2B5EF4-FFF2-40B4-BE49-F238E27FC236}">
-                <a16:creationId xmlns:a16="http://schemas.microsoft.com/office/drawing/2014/main" id="{7A0F2412-4D8D-AC3E-1892-1E0858F8D269}"/>
-              </a:ext>
-            </a:extLst>
-          </p:cNvPr>
-          <p:cNvSpPr txBox="1"/>
-          <p:nvPr/>
-        </p:nvSpPr>
-        <p:spPr>
-          <a:xfrm>
-            <a:off x="9236497" y="3262630"/>
-            <a:ext cx="1809750" cy="1477328"/>
-          </a:xfrm>
-          <a:prstGeom prst="rect">
-            <a:avLst/>
-          </a:prstGeom>
-          <a:noFill/>
-        </p:spPr>
-        <p:txBody>
-          <a:bodyPr wrap="square" rtlCol="0">
-            <a:spAutoFit/>
-          </a:bodyPr>
-          <a:lstStyle/>
-          <a:p>
-            <a:pPr algn="ctr"/>
-            <a:r>
-              <a:rPr lang="en-US" dirty="0"/>
-              <a:t>User can use mobile app to view statistics and current score</a:t>
-            </a:r>
+              <a:rPr lang="en-US" sz="6000" dirty="0"/>
+              <a:t>Backup</a:t>
+            </a:r>
+          </a:p>
+        </p:txBody>
+      </p:sp>
+      <p:sp>
+        <p:nvSpPr>
+          <p:cNvPr id="2" name="Date Placeholder 1">
+            <a:extLst>
+              <a:ext uri="{FF2B5EF4-FFF2-40B4-BE49-F238E27FC236}">
+                <a16:creationId xmlns:a16="http://schemas.microsoft.com/office/drawing/2014/main" id="{8A6A8B81-3409-053C-B5A1-E588B0D333B5}"/>
+              </a:ext>
+            </a:extLst>
+          </p:cNvPr>
+          <p:cNvSpPr>
+            <a:spLocks noGrp="1"/>
+          </p:cNvSpPr>
+          <p:nvPr>
+            <p:ph type="dt" sz="half" idx="10"/>
+          </p:nvPr>
+        </p:nvSpPr>
+        <p:spPr/>
+        <p:txBody>
+          <a:bodyPr/>
+          <a:lstStyle/>
+          <a:p>
+            <a:r>
+              <a:rPr lang="en-US"/>
+              <a:t>9/18/2023</a:t>
+            </a:r>
+          </a:p>
+        </p:txBody>
+      </p:sp>
+      <p:sp>
+        <p:nvSpPr>
+          <p:cNvPr id="4" name="Footer Placeholder 3">
+            <a:extLst>
+              <a:ext uri="{FF2B5EF4-FFF2-40B4-BE49-F238E27FC236}">
+                <a16:creationId xmlns:a16="http://schemas.microsoft.com/office/drawing/2014/main" id="{03F6CE37-AF22-E99B-BD8B-0C30B7ECE448}"/>
+              </a:ext>
+            </a:extLst>
+          </p:cNvPr>
+          <p:cNvSpPr>
+            <a:spLocks noGrp="1"/>
+          </p:cNvSpPr>
+          <p:nvPr>
+            <p:ph type="ftr" sz="quarter" idx="11"/>
+          </p:nvPr>
+        </p:nvSpPr>
+        <p:spPr/>
+        <p:txBody>
+          <a:bodyPr/>
+          <a:lstStyle/>
+          <a:p>
+            <a:r>
+              <a:rPr lang="en-US"/>
+              <a:t>Preliminary Design Review</a:t>
+            </a:r>
+          </a:p>
+        </p:txBody>
+      </p:sp>
+      <p:sp>
+        <p:nvSpPr>
+          <p:cNvPr id="5" name="Slide Number Placeholder 4">
+            <a:extLst>
+              <a:ext uri="{FF2B5EF4-FFF2-40B4-BE49-F238E27FC236}">
+                <a16:creationId xmlns:a16="http://schemas.microsoft.com/office/drawing/2014/main" id="{BCC2F5D8-5262-3D15-37F5-3B626B7F3BF2}"/>
+              </a:ext>
+            </a:extLst>
+          </p:cNvPr>
+          <p:cNvSpPr>
+            <a:spLocks noGrp="1"/>
+          </p:cNvSpPr>
+          <p:nvPr>
+            <p:ph type="sldNum" sz="quarter" idx="12"/>
+          </p:nvPr>
+        </p:nvSpPr>
+        <p:spPr/>
+        <p:txBody>
+          <a:bodyPr/>
+          <a:lstStyle/>
+          <a:p>
+            <a:fld id="{932DE7C4-7503-4383-A791-176189BE253C}" type="slidenum">
+              <a:rPr lang="en-US" smtClean="0"/>
+              <a:t>9</a:t>
+            </a:fld>
+            <a:endParaRPr lang="en-US"/>
           </a:p>
         </p:txBody>
       </p:sp>
     </p:spTree>
     <p:extLst>
       <p:ext uri="{BB962C8B-B14F-4D97-AF65-F5344CB8AC3E}">
-        <p14:creationId xmlns:p14="http://schemas.microsoft.com/office/powerpoint/2010/main" val="2620406225"/>
+        <p14:creationId xmlns:p14="http://schemas.microsoft.com/office/powerpoint/2010/main" val="46388902"/>
       </p:ext>
     </p:extLst>
   </p:cSld>
@@ -4875,4 +6103,299 @@
     </a:ext>
   </a:extLst>
 </a:theme>
+</file>
+
+<file path=ppt/theme/theme2.xml><?xml version="1.0" encoding="utf-8"?>
+<a:theme xmlns:a="http://schemas.openxmlformats.org/drawingml/2006/main" name="Office Theme">
+  <a:themeElements>
+    <a:clrScheme name="Office">
+      <a:dk1>
+        <a:sysClr val="windowText" lastClr="000000"/>
+      </a:dk1>
+      <a:lt1>
+        <a:sysClr val="window" lastClr="FFFFFF"/>
+      </a:lt1>
+      <a:dk2>
+        <a:srgbClr val="44546A"/>
+      </a:dk2>
+      <a:lt2>
+        <a:srgbClr val="E7E6E6"/>
+      </a:lt2>
+      <a:accent1>
+        <a:srgbClr val="4472C4"/>
+      </a:accent1>
+      <a:accent2>
+        <a:srgbClr val="ED7D31"/>
+      </a:accent2>
+      <a:accent3>
+        <a:srgbClr val="A5A5A5"/>
+      </a:accent3>
+      <a:accent4>
+        <a:srgbClr val="FFC000"/>
+      </a:accent4>
+      <a:accent5>
+        <a:srgbClr val="5B9BD5"/>
+      </a:accent5>
+      <a:accent6>
+        <a:srgbClr val="70AD47"/>
+      </a:accent6>
+      <a:hlink>
+        <a:srgbClr val="0563C1"/>
+      </a:hlink>
+      <a:folHlink>
+        <a:srgbClr val="954F72"/>
+      </a:folHlink>
+    </a:clrScheme>
+    <a:fontScheme name="Office">
+      <a:majorFont>
+        <a:latin typeface="Calibri Light" panose="020F0302020204030204"/>
+        <a:ea typeface=""/>
+        <a:cs typeface=""/>
+        <a:font script="Jpan" typeface="游ゴシック Light"/>
+        <a:font script="Hang" typeface="맑은 고딕"/>
+        <a:font script="Hans" typeface="等线 Light"/>
+        <a:font script="Hant" typeface="新細明體"/>
+        <a:font script="Arab" typeface="Times New Roman"/>
+        <a:font script="Hebr" typeface="Times New Roman"/>
+        <a:font script="Thai" typeface="Angsana New"/>
+        <a:font script="Ethi" typeface="Nyala"/>
+        <a:font script="Beng" typeface="Vrinda"/>
+        <a:font script="Gujr" typeface="Shruti"/>
+        <a:font script="Khmr" typeface="MoolBoran"/>
+        <a:font script="Knda" typeface="Tunga"/>
+        <a:font script="Guru" typeface="Raavi"/>
+        <a:font script="Cans" typeface="Euphemia"/>
+        <a:font script="Cher" typeface="Plantagenet Cherokee"/>
+        <a:font script="Yiii" typeface="Microsoft Yi Baiti"/>
+        <a:font script="Tibt" typeface="Microsoft Himalaya"/>
+        <a:font script="Thaa" typeface="MV Boli"/>
+        <a:font script="Deva" typeface="Mangal"/>
+        <a:font script="Telu" typeface="Gautami"/>
+        <a:font script="Taml" typeface="Latha"/>
+        <a:font script="Syrc" typeface="Estrangelo Edessa"/>
+        <a:font script="Orya" typeface="Kalinga"/>
+        <a:font script="Mlym" typeface="Kartika"/>
+        <a:font script="Laoo" typeface="DokChampa"/>
+        <a:font script="Sinh" typeface="Iskoola Pota"/>
+        <a:font script="Mong" typeface="Mongolian Baiti"/>
+        <a:font script="Viet" typeface="Times New Roman"/>
+        <a:font script="Uigh" typeface="Microsoft Uighur"/>
+        <a:font script="Geor" typeface="Sylfaen"/>
+        <a:font script="Armn" typeface="Arial"/>
+        <a:font script="Bugi" typeface="Leelawadee UI"/>
+        <a:font script="Bopo" typeface="Microsoft JhengHei"/>
+        <a:font script="Java" typeface="Javanese Text"/>
+        <a:font script="Lisu" typeface="Segoe UI"/>
+        <a:font script="Mymr" typeface="Myanmar Text"/>
+        <a:font script="Nkoo" typeface="Ebrima"/>
+        <a:font script="Olck" typeface="Nirmala UI"/>
+        <a:font script="Osma" typeface="Ebrima"/>
+        <a:font script="Phag" typeface="Phagspa"/>
+        <a:font script="Syrn" typeface="Estrangelo Edessa"/>
+        <a:font script="Syrj" typeface="Estrangelo Edessa"/>
+        <a:font script="Syre" typeface="Estrangelo Edessa"/>
+        <a:font script="Sora" typeface="Nirmala UI"/>
+        <a:font script="Tale" typeface="Microsoft Tai Le"/>
+        <a:font script="Talu" typeface="Microsoft New Tai Lue"/>
+        <a:font script="Tfng" typeface="Ebrima"/>
+      </a:majorFont>
+      <a:minorFont>
+        <a:latin typeface="Calibri" panose="020F0502020204030204"/>
+        <a:ea typeface=""/>
+        <a:cs typeface=""/>
+        <a:font script="Jpan" typeface="游ゴシック"/>
+        <a:font script="Hang" typeface="맑은 고딕"/>
+        <a:font script="Hans" typeface="等线"/>
+        <a:font script="Hant" typeface="新細明體"/>
+        <a:font script="Arab" typeface="Arial"/>
+        <a:font script="Hebr" typeface="Arial"/>
+        <a:font script="Thai" typeface="Cordia New"/>
+        <a:font script="Ethi" typeface="Nyala"/>
+        <a:font script="Beng" typeface="Vrinda"/>
+        <a:font script="Gujr" typeface="Shruti"/>
+        <a:font script="Khmr" typeface="DaunPenh"/>
+        <a:font script="Knda" typeface="Tunga"/>
+        <a:font script="Guru" typeface="Raavi"/>
+        <a:font script="Cans" typeface="Euphemia"/>
+        <a:font script="Cher" typeface="Plantagenet Cherokee"/>
+        <a:font script="Yiii" typeface="Microsoft Yi Baiti"/>
+        <a:font script="Tibt" typeface="Microsoft Himalaya"/>
+        <a:font script="Thaa" typeface="MV Boli"/>
+        <a:font script="Deva" typeface="Mangal"/>
+        <a:font script="Telu" typeface="Gautami"/>
+        <a:font script="Taml" typeface="Latha"/>
+        <a:font script="Syrc" typeface="Estrangelo Edessa"/>
+        <a:font script="Orya" typeface="Kalinga"/>
+        <a:font script="Mlym" typeface="Kartika"/>
+        <a:font script="Laoo" typeface="DokChampa"/>
+        <a:font script="Sinh" typeface="Iskoola Pota"/>
+        <a:font script="Mong" typeface="Mongolian Baiti"/>
+        <a:font script="Viet" typeface="Arial"/>
+        <a:font script="Uigh" typeface="Microsoft Uighur"/>
+        <a:font script="Geor" typeface="Sylfaen"/>
+        <a:font script="Armn" typeface="Arial"/>
+        <a:font script="Bugi" typeface="Leelawadee UI"/>
+        <a:font script="Bopo" typeface="Microsoft JhengHei"/>
+        <a:font script="Java" typeface="Javanese Text"/>
+        <a:font script="Lisu" typeface="Segoe UI"/>
+        <a:font script="Mymr" typeface="Myanmar Text"/>
+        <a:font script="Nkoo" typeface="Ebrima"/>
+        <a:font script="Olck" typeface="Nirmala UI"/>
+        <a:font script="Osma" typeface="Ebrima"/>
+        <a:font script="Phag" typeface="Phagspa"/>
+        <a:font script="Syrn" typeface="Estrangelo Edessa"/>
+        <a:font script="Syrj" typeface="Estrangelo Edessa"/>
+        <a:font script="Syre" typeface="Estrangelo Edessa"/>
+        <a:font script="Sora" typeface="Nirmala UI"/>
+        <a:font script="Tale" typeface="Microsoft Tai Le"/>
+        <a:font script="Talu" typeface="Microsoft New Tai Lue"/>
+        <a:font script="Tfng" typeface="Ebrima"/>
+      </a:minorFont>
+    </a:fontScheme>
+    <a:fmtScheme name="Office">
+      <a:fillStyleLst>
+        <a:solidFill>
+          <a:schemeClr val="phClr"/>
+        </a:solidFill>
+        <a:gradFill rotWithShape="1">
+          <a:gsLst>
+            <a:gs pos="0">
+              <a:schemeClr val="phClr">
+                <a:lumMod val="110000"/>
+                <a:satMod val="105000"/>
+                <a:tint val="67000"/>
+              </a:schemeClr>
+            </a:gs>
+            <a:gs pos="50000">
+              <a:schemeClr val="phClr">
+                <a:lumMod val="105000"/>
+                <a:satMod val="103000"/>
+                <a:tint val="73000"/>
+              </a:schemeClr>
+            </a:gs>
+            <a:gs pos="100000">
+              <a:schemeClr val="phClr">
+                <a:lumMod val="105000"/>
+                <a:satMod val="109000"/>
+                <a:tint val="81000"/>
+              </a:schemeClr>
+            </a:gs>
+          </a:gsLst>
+          <a:lin ang="5400000" scaled="0"/>
+        </a:gradFill>
+        <a:gradFill rotWithShape="1">
+          <a:gsLst>
+            <a:gs pos="0">
+              <a:schemeClr val="phClr">
+                <a:satMod val="103000"/>
+                <a:lumMod val="102000"/>
+                <a:tint val="94000"/>
+              </a:schemeClr>
+            </a:gs>
+            <a:gs pos="50000">
+              <a:schemeClr val="phClr">
+                <a:satMod val="110000"/>
+                <a:lumMod val="100000"/>
+                <a:shade val="100000"/>
+              </a:schemeClr>
+            </a:gs>
+            <a:gs pos="100000">
+              <a:schemeClr val="phClr">
+                <a:lumMod val="99000"/>
+                <a:satMod val="120000"/>
+                <a:shade val="78000"/>
+              </a:schemeClr>
+            </a:gs>
+          </a:gsLst>
+          <a:lin ang="5400000" scaled="0"/>
+        </a:gradFill>
+      </a:fillStyleLst>
+      <a:lnStyleLst>
+        <a:ln w="6350" cap="flat" cmpd="sng" algn="ctr">
+          <a:solidFill>
+            <a:schemeClr val="phClr"/>
+          </a:solidFill>
+          <a:prstDash val="solid"/>
+          <a:miter lim="800000"/>
+        </a:ln>
+        <a:ln w="12700" cap="flat" cmpd="sng" algn="ctr">
+          <a:solidFill>
+            <a:schemeClr val="phClr"/>
+          </a:solidFill>
+          <a:prstDash val="solid"/>
+          <a:miter lim="800000"/>
+        </a:ln>
+        <a:ln w="19050" cap="flat" cmpd="sng" algn="ctr">
+          <a:solidFill>
+            <a:schemeClr val="phClr"/>
+          </a:solidFill>
+          <a:prstDash val="solid"/>
+          <a:miter lim="800000"/>
+        </a:ln>
+      </a:lnStyleLst>
+      <a:effectStyleLst>
+        <a:effectStyle>
+          <a:effectLst/>
+        </a:effectStyle>
+        <a:effectStyle>
+          <a:effectLst/>
+        </a:effectStyle>
+        <a:effectStyle>
+          <a:effectLst>
+            <a:outerShdw blurRad="57150" dist="19050" dir="5400000" algn="ctr" rotWithShape="0">
+              <a:srgbClr val="000000">
+                <a:alpha val="63000"/>
+              </a:srgbClr>
+            </a:outerShdw>
+          </a:effectLst>
+        </a:effectStyle>
+      </a:effectStyleLst>
+      <a:bgFillStyleLst>
+        <a:solidFill>
+          <a:schemeClr val="phClr"/>
+        </a:solidFill>
+        <a:solidFill>
+          <a:schemeClr val="phClr">
+            <a:tint val="95000"/>
+            <a:satMod val="170000"/>
+          </a:schemeClr>
+        </a:solidFill>
+        <a:gradFill rotWithShape="1">
+          <a:gsLst>
+            <a:gs pos="0">
+              <a:schemeClr val="phClr">
+                <a:tint val="93000"/>
+                <a:satMod val="150000"/>
+                <a:shade val="98000"/>
+                <a:lumMod val="102000"/>
+              </a:schemeClr>
+            </a:gs>
+            <a:gs pos="50000">
+              <a:schemeClr val="phClr">
+                <a:tint val="98000"/>
+                <a:satMod val="130000"/>
+                <a:shade val="90000"/>
+                <a:lumMod val="103000"/>
+              </a:schemeClr>
+            </a:gs>
+            <a:gs pos="100000">
+              <a:schemeClr val="phClr">
+                <a:shade val="63000"/>
+                <a:satMod val="120000"/>
+              </a:schemeClr>
+            </a:gs>
+          </a:gsLst>
+          <a:lin ang="5400000" scaled="0"/>
+        </a:gradFill>
+      </a:bgFillStyleLst>
+    </a:fmtScheme>
+  </a:themeElements>
+  <a:objectDefaults/>
+  <a:extraClrSchemeLst/>
+  <a:extLst>
+    <a:ext uri="{05A4C25C-085E-4340-85A3-A5531E510DB2}">
+      <thm15:themeFamily xmlns:thm15="http://schemas.microsoft.com/office/thememl/2012/main" name="Office Theme" id="{62F939B6-93AF-4DB8-9C6B-D6C7DFDC589F}" vid="{4A3C46E8-61CC-4603-A589-7422A47A8E4A}"/>
+    </a:ext>
+  </a:extLst>
+</a:theme>
 </file>
</xml_diff>